<commit_message>
Updated size limits slides
</commit_message>
<xml_diff>
--- a/modules/MgmntSizeLimits/PPT.pptx
+++ b/modules/MgmntSizeLimits/PPT.pptx
@@ -13816,23 +13816,38 @@
           </a:p>
           <a:p>
             <a:r>
+              <a:rPr lang="en-US" dirty="0">
+                <a:hlinkClick r:id="rId3"/>
+              </a:rPr>
+              <a:t>C</a:t>
+            </a:r>
+            <a:r>
               <a:rPr lang="en-US" dirty="0" smtClean="0">
                 <a:hlinkClick r:id="rId3"/>
               </a:rPr>
-              <a:t>Check this out!</a:t>
+              <a:t>heck this out!</a:t>
             </a:r>
             <a:r>
-              <a:rPr lang="en-US" sz="1400" dirty="0" smtClean="0"/>
-              <a:t> (0:45-3:30)</a:t>
+              <a:rPr lang="en-US" dirty="0" smtClean="0"/>
+              <a:t> </a:t>
             </a:r>
-            <a:endParaRPr lang="en-US" dirty="0" smtClean="0"/>
+            <a:r>
+              <a:rPr lang="en-US" sz="1400" dirty="0"/>
+              <a:t>(0:31-2:18)</a:t>
+            </a:r>
           </a:p>
           <a:p>
             <a:r>
               <a:rPr lang="en-US" dirty="0" smtClean="0">
                 <a:hlinkClick r:id="rId4"/>
               </a:rPr>
-              <a:t>But also see this!</a:t>
+              <a:t>But </a:t>
+            </a:r>
+            <a:r>
+              <a:rPr lang="en-US" dirty="0" smtClean="0">
+                <a:hlinkClick r:id="rId4"/>
+              </a:rPr>
+              <a:t>also see this!</a:t>
             </a:r>
             <a:r>
               <a:rPr lang="en-US" dirty="0"/>
@@ -13847,36 +13862,33 @@
               <a:t>0:00-0:50</a:t>
             </a:r>
             <a:r>
-              <a:rPr lang="en-US" sz="1400" dirty="0"/>
+              <a:rPr lang="en-US" sz="1400" dirty="0" smtClean="0"/>
               <a:t>)</a:t>
             </a:r>
             <a:endParaRPr lang="en-US" sz="1400" dirty="0" smtClean="0"/>
           </a:p>
           <a:p>
             <a:r>
+              <a:rPr lang="en-US" dirty="0">
+                <a:hlinkClick r:id="rId5"/>
+              </a:rPr>
+              <a:t>A</a:t>
+            </a:r>
+            <a:r>
               <a:rPr lang="en-US" dirty="0" smtClean="0">
                 <a:hlinkClick r:id="rId5"/>
               </a:rPr>
-              <a:t>But then </a:t>
+              <a:t>nd note this!</a:t>
             </a:r>
             <a:r>
-              <a:rPr lang="en-US" smtClean="0">
-                <a:hlinkClick r:id="rId5"/>
-              </a:rPr>
-              <a:t>this!</a:t>
-            </a:r>
-            <a:r>
-              <a:rPr lang="en-US" smtClean="0"/>
+              <a:rPr lang="en-US" sz="1400" dirty="0" smtClean="0"/>
               <a:t> </a:t>
             </a:r>
             <a:r>
-              <a:rPr lang="en-US" sz="1400" smtClean="0"/>
-              <a:t>(</a:t>
+              <a:rPr lang="en-US" sz="1400" dirty="0"/>
+              <a:t>(0:45-3:30)</a:t>
             </a:r>
-            <a:r>
-              <a:rPr lang="en-US" sz="1400" dirty="0" smtClean="0"/>
-              <a:t>0:31-2:18)</a:t>
-            </a:r>
+            <a:endParaRPr lang="en-US" dirty="0"/>
           </a:p>
           <a:p>
             <a:endParaRPr lang="en-US" dirty="0" smtClean="0"/>
@@ -18778,11 +18790,11 @@
   <p:clrMapOvr>
     <a:masterClrMapping/>
   </p:clrMapOvr>
-  <mc:AlternateContent xmlns:mc="http://schemas.openxmlformats.org/markup-compatibility/2006">
-    <mc:Choice xmlns:p14="http://schemas.microsoft.com/office/powerpoint/2010/main" Requires="p14">
+  <mc:AlternateContent xmlns:mc="http://schemas.openxmlformats.org/markup-compatibility/2006" xmlns:p14="http://schemas.microsoft.com/office/powerpoint/2010/main">
+    <mc:Choice Requires="p14">
       <p:transition spd="slow" p14:dur="2000"/>
     </mc:Choice>
-    <mc:Fallback>
+    <mc:Fallback xmlns="">
       <p:transition spd="slow"/>
     </mc:Fallback>
   </mc:AlternateContent>

</xml_diff>

<commit_message>
Updated Size Limits PPT
</commit_message>
<xml_diff>
--- a/modules/MgmntSizeLimits/PPT.pptx
+++ b/modules/MgmntSizeLimits/PPT.pptx
@@ -5,10 +5,10 @@
     <p:sldMasterId id="2147483648" r:id="rId1"/>
   </p:sldMasterIdLst>
   <p:notesMasterIdLst>
-    <p:notesMasterId r:id="rId11"/>
+    <p:notesMasterId r:id="rId12"/>
   </p:notesMasterIdLst>
   <p:handoutMasterIdLst>
-    <p:handoutMasterId r:id="rId12"/>
+    <p:handoutMasterId r:id="rId13"/>
   </p:handoutMasterIdLst>
   <p:sldIdLst>
     <p:sldId id="256" r:id="rId2"/>
@@ -18,8 +18,9 @@
     <p:sldId id="287" r:id="rId6"/>
     <p:sldId id="289" r:id="rId7"/>
     <p:sldId id="268" r:id="rId8"/>
-    <p:sldId id="286" r:id="rId9"/>
-    <p:sldId id="298" r:id="rId10"/>
+    <p:sldId id="299" r:id="rId9"/>
+    <p:sldId id="286" r:id="rId10"/>
+    <p:sldId id="298" r:id="rId11"/>
   </p:sldIdLst>
   <p:sldSz cx="9144000" cy="6858000" type="screen4x3"/>
   <p:notesSz cx="6858000" cy="9190038"/>
@@ -896,6 +897,95 @@
     <p:extLst>
       <p:ext uri="{BB962C8B-B14F-4D97-AF65-F5344CB8AC3E}">
         <p14:creationId xmlns:p14="http://schemas.microsoft.com/office/powerpoint/2010/main" val="3316413596"/>
+      </p:ext>
+    </p:extLst>
+  </p:cSld>
+  <p:clrMapOvr>
+    <a:masterClrMapping/>
+  </p:clrMapOvr>
+</p:notes>
+</file>
+
+<file path=ppt/notesSlides/notesSlide2.xml><?xml version="1.0" encoding="utf-8"?>
+<p:notes xmlns:a="http://schemas.openxmlformats.org/drawingml/2006/main" xmlns:r="http://schemas.openxmlformats.org/officeDocument/2006/relationships" xmlns:p="http://schemas.openxmlformats.org/presentationml/2006/main">
+  <p:cSld>
+    <p:spTree>
+      <p:nvGrpSpPr>
+        <p:cNvPr id="1" name=""/>
+        <p:cNvGrpSpPr/>
+        <p:nvPr/>
+      </p:nvGrpSpPr>
+      <p:grpSpPr>
+        <a:xfrm>
+          <a:off x="0" y="0"/>
+          <a:ext cx="0" cy="0"/>
+          <a:chOff x="0" y="0"/>
+          <a:chExt cx="0" cy="0"/>
+        </a:xfrm>
+      </p:grpSpPr>
+      <p:sp>
+        <p:nvSpPr>
+          <p:cNvPr id="2" name="Slide Image Placeholder 1"/>
+          <p:cNvSpPr>
+            <a:spLocks noGrp="1" noRot="1" noChangeAspect="1"/>
+          </p:cNvSpPr>
+          <p:nvPr>
+            <p:ph type="sldImg"/>
+          </p:nvPr>
+        </p:nvSpPr>
+        <p:spPr/>
+      </p:sp>
+      <p:sp>
+        <p:nvSpPr>
+          <p:cNvPr id="3" name="Notes Placeholder 2"/>
+          <p:cNvSpPr>
+            <a:spLocks noGrp="1"/>
+          </p:cNvSpPr>
+          <p:nvPr>
+            <p:ph type="body" idx="1"/>
+          </p:nvPr>
+        </p:nvSpPr>
+        <p:spPr/>
+        <p:txBody>
+          <a:bodyPr/>
+          <a:lstStyle/>
+          <a:p>
+            <a:r>
+              <a:rPr lang="en-US" dirty="0" smtClean="0"/>
+              <a:t>Stop video at 3:30</a:t>
+            </a:r>
+            <a:endParaRPr lang="en-US" dirty="0"/>
+          </a:p>
+        </p:txBody>
+      </p:sp>
+      <p:sp>
+        <p:nvSpPr>
+          <p:cNvPr id="4" name="Slide Number Placeholder 3"/>
+          <p:cNvSpPr>
+            <a:spLocks noGrp="1"/>
+          </p:cNvSpPr>
+          <p:nvPr>
+            <p:ph type="sldNum" sz="quarter" idx="10"/>
+          </p:nvPr>
+        </p:nvSpPr>
+        <p:spPr/>
+        <p:txBody>
+          <a:bodyPr/>
+          <a:lstStyle/>
+          <a:p>
+            <a:fld id="{FADDF222-3E90-4889-96E4-710F9B0B9833}" type="slidenum">
+              <a:rPr lang="en-US" smtClean="0"/>
+              <a:pPr/>
+              <a:t>8</a:t>
+            </a:fld>
+            <a:endParaRPr lang="en-US"/>
+          </a:p>
+        </p:txBody>
+      </p:sp>
+    </p:spTree>
+    <p:extLst>
+      <p:ext uri="{BB962C8B-B14F-4D97-AF65-F5344CB8AC3E}">
+        <p14:creationId xmlns:p14="http://schemas.microsoft.com/office/powerpoint/2010/main" val="2838809632"/>
       </p:ext>
     </p:extLst>
   </p:cSld>
@@ -3806,6 +3896,1493 @@
 </p:sld>
 </file>
 
+<file path=ppt/slides/slide10.xml><?xml version="1.0" encoding="utf-8"?>
+<p:sld xmlns:a="http://schemas.openxmlformats.org/drawingml/2006/main" xmlns:r="http://schemas.openxmlformats.org/officeDocument/2006/relationships" xmlns:p="http://schemas.openxmlformats.org/presentationml/2006/main">
+  <p:cSld>
+    <p:spTree>
+      <p:nvGrpSpPr>
+        <p:cNvPr id="1" name=""/>
+        <p:cNvGrpSpPr/>
+        <p:nvPr/>
+      </p:nvGrpSpPr>
+      <p:grpSpPr>
+        <a:xfrm>
+          <a:off x="0" y="0"/>
+          <a:ext cx="0" cy="0"/>
+          <a:chOff x="0" y="0"/>
+          <a:chExt cx="0" cy="0"/>
+        </a:xfrm>
+      </p:grpSpPr>
+      <p:sp>
+        <p:nvSpPr>
+          <p:cNvPr id="3" name="Content Placeholder 2"/>
+          <p:cNvSpPr>
+            <a:spLocks noGrp="1"/>
+          </p:cNvSpPr>
+          <p:nvPr>
+            <p:ph idx="1"/>
+          </p:nvPr>
+        </p:nvSpPr>
+        <p:spPr>
+          <a:xfrm>
+            <a:off x="228600" y="1828800"/>
+            <a:ext cx="8686800" cy="3124200"/>
+          </a:xfrm>
+        </p:spPr>
+        <p:txBody>
+          <a:bodyPr/>
+          <a:lstStyle/>
+          <a:p>
+            <a:r>
+              <a:rPr lang="en-US" dirty="0" smtClean="0"/>
+              <a:t>Possible reasons to use.</a:t>
+            </a:r>
+          </a:p>
+          <a:p>
+            <a:pPr lvl="1"/>
+            <a:r>
+              <a:rPr lang="en-US" dirty="0" smtClean="0"/>
+              <a:t>Protect relatively few sexually mature adults.</a:t>
+            </a:r>
+          </a:p>
+          <a:p>
+            <a:pPr lvl="1"/>
+            <a:r>
+              <a:rPr lang="en-US" dirty="0" smtClean="0"/>
+              <a:t>Protect important large </a:t>
+            </a:r>
+            <a:r>
+              <a:rPr lang="en-US" dirty="0" err="1" smtClean="0"/>
+              <a:t>spawners</a:t>
+            </a:r>
+            <a:r>
+              <a:rPr lang="en-US" dirty="0" smtClean="0"/>
+              <a:t>.</a:t>
+            </a:r>
+          </a:p>
+          <a:p>
+            <a:pPr lvl="1"/>
+            <a:r>
+              <a:rPr lang="en-US" dirty="0" smtClean="0"/>
+              <a:t>Reduce numbers of small fish (and potentially increase growth rates).</a:t>
+            </a:r>
+          </a:p>
+        </p:txBody>
+      </p:sp>
+      <p:sp>
+        <p:nvSpPr>
+          <p:cNvPr id="4" name="Footer Placeholder 3"/>
+          <p:cNvSpPr>
+            <a:spLocks noGrp="1"/>
+          </p:cNvSpPr>
+          <p:nvPr>
+            <p:ph type="ftr" sz="quarter" idx="10"/>
+          </p:nvPr>
+        </p:nvSpPr>
+        <p:spPr/>
+        <p:txBody>
+          <a:bodyPr/>
+          <a:lstStyle/>
+          <a:p>
+            <a:r>
+              <a:rPr lang="en-US" smtClean="0"/>
+              <a:t>Management Regulations</a:t>
+            </a:r>
+            <a:endParaRPr lang="en-US"/>
+          </a:p>
+        </p:txBody>
+      </p:sp>
+      <p:sp>
+        <p:nvSpPr>
+          <p:cNvPr id="5" name="Slide Number Placeholder 4"/>
+          <p:cNvSpPr>
+            <a:spLocks noGrp="1"/>
+          </p:cNvSpPr>
+          <p:nvPr>
+            <p:ph type="sldNum" sz="quarter" idx="11"/>
+          </p:nvPr>
+        </p:nvSpPr>
+        <p:spPr/>
+        <p:txBody>
+          <a:bodyPr/>
+          <a:lstStyle/>
+          <a:p>
+            <a:fld id="{1885BB51-0796-4632-BDB9-6CE403630838}" type="slidenum">
+              <a:rPr lang="en-US" smtClean="0"/>
+              <a:pPr/>
+              <a:t>10</a:t>
+            </a:fld>
+            <a:endParaRPr lang="en-US"/>
+          </a:p>
+        </p:txBody>
+      </p:sp>
+      <p:graphicFrame>
+        <p:nvGraphicFramePr>
+          <p:cNvPr id="6" name="Content Placeholder 5"/>
+          <p:cNvGraphicFramePr>
+            <a:graphicFrameLocks/>
+          </p:cNvGraphicFramePr>
+          <p:nvPr>
+            <p:extLst>
+              <p:ext uri="{D42A27DB-BD31-4B8C-83A1-F6EECF244321}">
+                <p14:modId xmlns:p14="http://schemas.microsoft.com/office/powerpoint/2010/main" val="2532670350"/>
+              </p:ext>
+            </p:extLst>
+          </p:nvPr>
+        </p:nvGraphicFramePr>
+        <p:xfrm>
+          <a:off x="381000" y="990600"/>
+          <a:ext cx="8229581" cy="370840"/>
+        </p:xfrm>
+        <a:graphic>
+          <a:graphicData uri="http://schemas.openxmlformats.org/drawingml/2006/table">
+            <a:tbl>
+              <a:tblPr firstRow="1" bandRow="1">
+                <a:tableStyleId>{5C22544A-7EE6-4342-B048-85BDC9FD1C3A}</a:tableStyleId>
+              </a:tblPr>
+              <a:tblGrid>
+                <a:gridCol w="484093"/>
+                <a:gridCol w="484093"/>
+                <a:gridCol w="484093"/>
+                <a:gridCol w="484093"/>
+                <a:gridCol w="484093"/>
+                <a:gridCol w="484093"/>
+                <a:gridCol w="484093"/>
+                <a:gridCol w="484093"/>
+                <a:gridCol w="484093"/>
+                <a:gridCol w="484093"/>
+                <a:gridCol w="484093"/>
+                <a:gridCol w="484093"/>
+                <a:gridCol w="484093"/>
+                <a:gridCol w="484093"/>
+                <a:gridCol w="484093"/>
+                <a:gridCol w="484093"/>
+                <a:gridCol w="484093"/>
+              </a:tblGrid>
+              <a:tr h="370840">
+                <a:tc>
+                  <a:txBody>
+                    <a:bodyPr/>
+                    <a:lstStyle/>
+                    <a:p>
+                      <a:pPr algn="ctr"/>
+                      <a:r>
+                        <a:rPr lang="en-US" dirty="0" smtClean="0">
+                          <a:solidFill>
+                            <a:schemeClr val="tx1"/>
+                          </a:solidFill>
+                        </a:rPr>
+                        <a:t>6</a:t>
+                      </a:r>
+                      <a:endParaRPr lang="en-US" dirty="0">
+                        <a:solidFill>
+                          <a:schemeClr val="tx1"/>
+                        </a:solidFill>
+                      </a:endParaRPr>
+                    </a:p>
+                  </a:txBody>
+                  <a:tcPr>
+                    <a:lnL w="12700" cap="flat" cmpd="sng" algn="ctr">
+                      <a:noFill/>
+                      <a:prstDash val="solid"/>
+                      <a:round/>
+                      <a:headEnd type="none" w="med" len="med"/>
+                      <a:tailEnd type="none" w="med" len="med"/>
+                    </a:lnL>
+                    <a:lnR w="12700" cap="flat" cmpd="sng" algn="ctr">
+                      <a:solidFill>
+                        <a:schemeClr val="tx1"/>
+                      </a:solidFill>
+                      <a:prstDash val="solid"/>
+                      <a:round/>
+                      <a:headEnd type="none" w="med" len="med"/>
+                      <a:tailEnd type="none" w="med" len="med"/>
+                    </a:lnR>
+                    <a:lnT w="12700" cap="flat" cmpd="sng" algn="ctr">
+                      <a:solidFill>
+                        <a:schemeClr val="tx1"/>
+                      </a:solidFill>
+                      <a:prstDash val="solid"/>
+                      <a:round/>
+                      <a:headEnd type="none" w="med" len="med"/>
+                      <a:tailEnd type="none" w="med" len="med"/>
+                    </a:lnT>
+                    <a:lnB w="12700" cap="flat" cmpd="sng" algn="ctr">
+                      <a:solidFill>
+                        <a:schemeClr val="tx1"/>
+                      </a:solidFill>
+                      <a:prstDash val="solid"/>
+                      <a:round/>
+                      <a:headEnd type="none" w="med" len="med"/>
+                      <a:tailEnd type="none" w="med" len="med"/>
+                    </a:lnB>
+                    <a:solidFill>
+                      <a:schemeClr val="bg1"/>
+                    </a:solidFill>
+                  </a:tcPr>
+                </a:tc>
+                <a:tc>
+                  <a:txBody>
+                    <a:bodyPr/>
+                    <a:lstStyle/>
+                    <a:p>
+                      <a:pPr algn="ctr"/>
+                      <a:r>
+                        <a:rPr lang="en-US" dirty="0" smtClean="0">
+                          <a:solidFill>
+                            <a:schemeClr val="tx1"/>
+                          </a:solidFill>
+                        </a:rPr>
+                        <a:t>7</a:t>
+                      </a:r>
+                      <a:endParaRPr lang="en-US" dirty="0">
+                        <a:solidFill>
+                          <a:schemeClr val="tx1"/>
+                        </a:solidFill>
+                      </a:endParaRPr>
+                    </a:p>
+                  </a:txBody>
+                  <a:tcPr>
+                    <a:lnL w="12700" cap="flat" cmpd="sng" algn="ctr">
+                      <a:solidFill>
+                        <a:schemeClr val="tx1"/>
+                      </a:solidFill>
+                      <a:prstDash val="solid"/>
+                      <a:round/>
+                      <a:headEnd type="none" w="med" len="med"/>
+                      <a:tailEnd type="none" w="med" len="med"/>
+                    </a:lnL>
+                    <a:lnR w="12700" cap="flat" cmpd="sng" algn="ctr">
+                      <a:solidFill>
+                        <a:schemeClr val="tx1"/>
+                      </a:solidFill>
+                      <a:prstDash val="solid"/>
+                      <a:round/>
+                      <a:headEnd type="none" w="med" len="med"/>
+                      <a:tailEnd type="none" w="med" len="med"/>
+                    </a:lnR>
+                    <a:lnT w="12700" cap="flat" cmpd="sng" algn="ctr">
+                      <a:solidFill>
+                        <a:schemeClr val="tx1"/>
+                      </a:solidFill>
+                      <a:prstDash val="solid"/>
+                      <a:round/>
+                      <a:headEnd type="none" w="med" len="med"/>
+                      <a:tailEnd type="none" w="med" len="med"/>
+                    </a:lnT>
+                    <a:lnB w="12700" cap="flat" cmpd="sng" algn="ctr">
+                      <a:solidFill>
+                        <a:schemeClr val="tx1"/>
+                      </a:solidFill>
+                      <a:prstDash val="solid"/>
+                      <a:round/>
+                      <a:headEnd type="none" w="med" len="med"/>
+                      <a:tailEnd type="none" w="med" len="med"/>
+                    </a:lnB>
+                    <a:solidFill>
+                      <a:schemeClr val="bg1"/>
+                    </a:solidFill>
+                  </a:tcPr>
+                </a:tc>
+                <a:tc>
+                  <a:txBody>
+                    <a:bodyPr/>
+                    <a:lstStyle/>
+                    <a:p>
+                      <a:pPr algn="ctr"/>
+                      <a:r>
+                        <a:rPr lang="en-US" dirty="0" smtClean="0">
+                          <a:solidFill>
+                            <a:schemeClr val="tx1"/>
+                          </a:solidFill>
+                        </a:rPr>
+                        <a:t>8</a:t>
+                      </a:r>
+                      <a:endParaRPr lang="en-US" dirty="0">
+                        <a:solidFill>
+                          <a:schemeClr val="tx1"/>
+                        </a:solidFill>
+                      </a:endParaRPr>
+                    </a:p>
+                  </a:txBody>
+                  <a:tcPr>
+                    <a:lnL w="12700" cap="flat" cmpd="sng" algn="ctr">
+                      <a:solidFill>
+                        <a:schemeClr val="tx1"/>
+                      </a:solidFill>
+                      <a:prstDash val="solid"/>
+                      <a:round/>
+                      <a:headEnd type="none" w="med" len="med"/>
+                      <a:tailEnd type="none" w="med" len="med"/>
+                    </a:lnL>
+                    <a:lnR w="12700" cap="flat" cmpd="sng" algn="ctr">
+                      <a:solidFill>
+                        <a:schemeClr val="tx1"/>
+                      </a:solidFill>
+                      <a:prstDash val="solid"/>
+                      <a:round/>
+                      <a:headEnd type="none" w="med" len="med"/>
+                      <a:tailEnd type="none" w="med" len="med"/>
+                    </a:lnR>
+                    <a:lnT w="12700" cap="flat" cmpd="sng" algn="ctr">
+                      <a:solidFill>
+                        <a:schemeClr val="tx1"/>
+                      </a:solidFill>
+                      <a:prstDash val="solid"/>
+                      <a:round/>
+                      <a:headEnd type="none" w="med" len="med"/>
+                      <a:tailEnd type="none" w="med" len="med"/>
+                    </a:lnT>
+                    <a:lnB w="12700" cap="flat" cmpd="sng" algn="ctr">
+                      <a:solidFill>
+                        <a:schemeClr val="tx1"/>
+                      </a:solidFill>
+                      <a:prstDash val="solid"/>
+                      <a:round/>
+                      <a:headEnd type="none" w="med" len="med"/>
+                      <a:tailEnd type="none" w="med" len="med"/>
+                    </a:lnB>
+                    <a:solidFill>
+                      <a:schemeClr val="bg1"/>
+                    </a:solidFill>
+                  </a:tcPr>
+                </a:tc>
+                <a:tc>
+                  <a:txBody>
+                    <a:bodyPr/>
+                    <a:lstStyle/>
+                    <a:p>
+                      <a:pPr algn="ctr"/>
+                      <a:r>
+                        <a:rPr lang="en-US" dirty="0" smtClean="0">
+                          <a:solidFill>
+                            <a:schemeClr val="tx1"/>
+                          </a:solidFill>
+                        </a:rPr>
+                        <a:t>9</a:t>
+                      </a:r>
+                      <a:endParaRPr lang="en-US" dirty="0">
+                        <a:solidFill>
+                          <a:schemeClr val="tx1"/>
+                        </a:solidFill>
+                      </a:endParaRPr>
+                    </a:p>
+                  </a:txBody>
+                  <a:tcPr>
+                    <a:lnL w="12700" cap="flat" cmpd="sng" algn="ctr">
+                      <a:solidFill>
+                        <a:schemeClr val="tx1"/>
+                      </a:solidFill>
+                      <a:prstDash val="solid"/>
+                      <a:round/>
+                      <a:headEnd type="none" w="med" len="med"/>
+                      <a:tailEnd type="none" w="med" len="med"/>
+                    </a:lnL>
+                    <a:lnR w="12700" cap="flat" cmpd="sng" algn="ctr">
+                      <a:solidFill>
+                        <a:schemeClr val="tx1"/>
+                      </a:solidFill>
+                      <a:prstDash val="solid"/>
+                      <a:round/>
+                      <a:headEnd type="none" w="med" len="med"/>
+                      <a:tailEnd type="none" w="med" len="med"/>
+                    </a:lnR>
+                    <a:lnT w="12700" cap="flat" cmpd="sng" algn="ctr">
+                      <a:solidFill>
+                        <a:schemeClr val="tx1"/>
+                      </a:solidFill>
+                      <a:prstDash val="solid"/>
+                      <a:round/>
+                      <a:headEnd type="none" w="med" len="med"/>
+                      <a:tailEnd type="none" w="med" len="med"/>
+                    </a:lnT>
+                    <a:lnB w="12700" cap="flat" cmpd="sng" algn="ctr">
+                      <a:solidFill>
+                        <a:schemeClr val="tx1"/>
+                      </a:solidFill>
+                      <a:prstDash val="solid"/>
+                      <a:round/>
+                      <a:headEnd type="none" w="med" len="med"/>
+                      <a:tailEnd type="none" w="med" len="med"/>
+                    </a:lnB>
+                    <a:solidFill>
+                      <a:schemeClr val="bg1"/>
+                    </a:solidFill>
+                  </a:tcPr>
+                </a:tc>
+                <a:tc>
+                  <a:txBody>
+                    <a:bodyPr/>
+                    <a:lstStyle/>
+                    <a:p>
+                      <a:pPr algn="ctr"/>
+                      <a:r>
+                        <a:rPr lang="en-US" dirty="0" smtClean="0">
+                          <a:solidFill>
+                            <a:schemeClr val="tx1"/>
+                          </a:solidFill>
+                        </a:rPr>
+                        <a:t>10</a:t>
+                      </a:r>
+                      <a:endParaRPr lang="en-US" dirty="0">
+                        <a:solidFill>
+                          <a:schemeClr val="tx1"/>
+                        </a:solidFill>
+                      </a:endParaRPr>
+                    </a:p>
+                  </a:txBody>
+                  <a:tcPr>
+                    <a:lnL w="12700" cap="flat" cmpd="sng" algn="ctr">
+                      <a:solidFill>
+                        <a:schemeClr val="tx1"/>
+                      </a:solidFill>
+                      <a:prstDash val="solid"/>
+                      <a:round/>
+                      <a:headEnd type="none" w="med" len="med"/>
+                      <a:tailEnd type="none" w="med" len="med"/>
+                    </a:lnL>
+                    <a:lnR w="12700" cap="flat" cmpd="sng" algn="ctr">
+                      <a:solidFill>
+                        <a:schemeClr val="tx1"/>
+                      </a:solidFill>
+                      <a:prstDash val="solid"/>
+                      <a:round/>
+                      <a:headEnd type="none" w="med" len="med"/>
+                      <a:tailEnd type="none" w="med" len="med"/>
+                    </a:lnR>
+                    <a:lnT w="12700" cap="flat" cmpd="sng" algn="ctr">
+                      <a:solidFill>
+                        <a:schemeClr val="tx1"/>
+                      </a:solidFill>
+                      <a:prstDash val="solid"/>
+                      <a:round/>
+                      <a:headEnd type="none" w="med" len="med"/>
+                      <a:tailEnd type="none" w="med" len="med"/>
+                    </a:lnT>
+                    <a:lnB w="12700" cap="flat" cmpd="sng" algn="ctr">
+                      <a:solidFill>
+                        <a:schemeClr val="tx1"/>
+                      </a:solidFill>
+                      <a:prstDash val="solid"/>
+                      <a:round/>
+                      <a:headEnd type="none" w="med" len="med"/>
+                      <a:tailEnd type="none" w="med" len="med"/>
+                    </a:lnB>
+                    <a:solidFill>
+                      <a:schemeClr val="bg1"/>
+                    </a:solidFill>
+                  </a:tcPr>
+                </a:tc>
+                <a:tc>
+                  <a:txBody>
+                    <a:bodyPr/>
+                    <a:lstStyle/>
+                    <a:p>
+                      <a:pPr algn="ctr"/>
+                      <a:r>
+                        <a:rPr lang="en-US" dirty="0" smtClean="0">
+                          <a:solidFill>
+                            <a:schemeClr val="tx1"/>
+                          </a:solidFill>
+                        </a:rPr>
+                        <a:t>11</a:t>
+                      </a:r>
+                      <a:endParaRPr lang="en-US" dirty="0">
+                        <a:solidFill>
+                          <a:schemeClr val="tx1"/>
+                        </a:solidFill>
+                      </a:endParaRPr>
+                    </a:p>
+                  </a:txBody>
+                  <a:tcPr>
+                    <a:lnL w="12700" cap="flat" cmpd="sng" algn="ctr">
+                      <a:solidFill>
+                        <a:schemeClr val="tx1"/>
+                      </a:solidFill>
+                      <a:prstDash val="solid"/>
+                      <a:round/>
+                      <a:headEnd type="none" w="med" len="med"/>
+                      <a:tailEnd type="none" w="med" len="med"/>
+                    </a:lnL>
+                    <a:lnR w="12700" cap="flat" cmpd="sng" algn="ctr">
+                      <a:solidFill>
+                        <a:schemeClr val="tx1"/>
+                      </a:solidFill>
+                      <a:prstDash val="solid"/>
+                      <a:round/>
+                      <a:headEnd type="none" w="med" len="med"/>
+                      <a:tailEnd type="none" w="med" len="med"/>
+                    </a:lnR>
+                    <a:lnT w="12700" cap="flat" cmpd="sng" algn="ctr">
+                      <a:solidFill>
+                        <a:schemeClr val="tx1"/>
+                      </a:solidFill>
+                      <a:prstDash val="solid"/>
+                      <a:round/>
+                      <a:headEnd type="none" w="med" len="med"/>
+                      <a:tailEnd type="none" w="med" len="med"/>
+                    </a:lnT>
+                    <a:lnB w="12700" cap="flat" cmpd="sng" algn="ctr">
+                      <a:solidFill>
+                        <a:schemeClr val="tx1"/>
+                      </a:solidFill>
+                      <a:prstDash val="solid"/>
+                      <a:round/>
+                      <a:headEnd type="none" w="med" len="med"/>
+                      <a:tailEnd type="none" w="med" len="med"/>
+                    </a:lnB>
+                    <a:solidFill>
+                      <a:schemeClr val="bg1"/>
+                    </a:solidFill>
+                  </a:tcPr>
+                </a:tc>
+                <a:tc>
+                  <a:txBody>
+                    <a:bodyPr/>
+                    <a:lstStyle/>
+                    <a:p>
+                      <a:pPr algn="ctr"/>
+                      <a:r>
+                        <a:rPr lang="en-US" dirty="0" smtClean="0">
+                          <a:solidFill>
+                            <a:schemeClr val="tx1"/>
+                          </a:solidFill>
+                        </a:rPr>
+                        <a:t>12</a:t>
+                      </a:r>
+                      <a:endParaRPr lang="en-US" dirty="0">
+                        <a:solidFill>
+                          <a:schemeClr val="tx1"/>
+                        </a:solidFill>
+                      </a:endParaRPr>
+                    </a:p>
+                  </a:txBody>
+                  <a:tcPr>
+                    <a:lnL w="12700" cap="flat" cmpd="sng" algn="ctr">
+                      <a:solidFill>
+                        <a:schemeClr val="tx1"/>
+                      </a:solidFill>
+                      <a:prstDash val="solid"/>
+                      <a:round/>
+                      <a:headEnd type="none" w="med" len="med"/>
+                      <a:tailEnd type="none" w="med" len="med"/>
+                    </a:lnL>
+                    <a:lnR w="12700" cap="flat" cmpd="sng" algn="ctr">
+                      <a:solidFill>
+                        <a:schemeClr val="tx1"/>
+                      </a:solidFill>
+                      <a:prstDash val="solid"/>
+                      <a:round/>
+                      <a:headEnd type="none" w="med" len="med"/>
+                      <a:tailEnd type="none" w="med" len="med"/>
+                    </a:lnR>
+                    <a:lnT w="12700" cap="flat" cmpd="sng" algn="ctr">
+                      <a:solidFill>
+                        <a:schemeClr val="tx1"/>
+                      </a:solidFill>
+                      <a:prstDash val="solid"/>
+                      <a:round/>
+                      <a:headEnd type="none" w="med" len="med"/>
+                      <a:tailEnd type="none" w="med" len="med"/>
+                    </a:lnT>
+                    <a:lnB w="12700" cap="flat" cmpd="sng" algn="ctr">
+                      <a:solidFill>
+                        <a:schemeClr val="tx1"/>
+                      </a:solidFill>
+                      <a:prstDash val="solid"/>
+                      <a:round/>
+                      <a:headEnd type="none" w="med" len="med"/>
+                      <a:tailEnd type="none" w="med" len="med"/>
+                    </a:lnB>
+                    <a:solidFill>
+                      <a:schemeClr val="bg1"/>
+                    </a:solidFill>
+                  </a:tcPr>
+                </a:tc>
+                <a:tc>
+                  <a:txBody>
+                    <a:bodyPr/>
+                    <a:lstStyle/>
+                    <a:p>
+                      <a:pPr algn="ctr"/>
+                      <a:r>
+                        <a:rPr lang="en-US" dirty="0" smtClean="0">
+                          <a:solidFill>
+                            <a:schemeClr val="tx1"/>
+                          </a:solidFill>
+                        </a:rPr>
+                        <a:t>13</a:t>
+                      </a:r>
+                      <a:endParaRPr lang="en-US" dirty="0">
+                        <a:solidFill>
+                          <a:schemeClr val="tx1"/>
+                        </a:solidFill>
+                      </a:endParaRPr>
+                    </a:p>
+                  </a:txBody>
+                  <a:tcPr>
+                    <a:lnL w="12700" cap="flat" cmpd="sng" algn="ctr">
+                      <a:solidFill>
+                        <a:schemeClr val="tx1"/>
+                      </a:solidFill>
+                      <a:prstDash val="solid"/>
+                      <a:round/>
+                      <a:headEnd type="none" w="med" len="med"/>
+                      <a:tailEnd type="none" w="med" len="med"/>
+                    </a:lnL>
+                    <a:lnR w="12700" cap="flat" cmpd="sng" algn="ctr">
+                      <a:solidFill>
+                        <a:schemeClr val="tx1"/>
+                      </a:solidFill>
+                      <a:prstDash val="solid"/>
+                      <a:round/>
+                      <a:headEnd type="none" w="med" len="med"/>
+                      <a:tailEnd type="none" w="med" len="med"/>
+                    </a:lnR>
+                    <a:lnT w="12700" cap="flat" cmpd="sng" algn="ctr">
+                      <a:solidFill>
+                        <a:schemeClr val="tx1"/>
+                      </a:solidFill>
+                      <a:prstDash val="solid"/>
+                      <a:round/>
+                      <a:headEnd type="none" w="med" len="med"/>
+                      <a:tailEnd type="none" w="med" len="med"/>
+                    </a:lnT>
+                    <a:lnB w="12700" cap="flat" cmpd="sng" algn="ctr">
+                      <a:solidFill>
+                        <a:schemeClr val="tx1"/>
+                      </a:solidFill>
+                      <a:prstDash val="solid"/>
+                      <a:round/>
+                      <a:headEnd type="none" w="med" len="med"/>
+                      <a:tailEnd type="none" w="med" len="med"/>
+                    </a:lnB>
+                    <a:solidFill>
+                      <a:schemeClr val="bg1"/>
+                    </a:solidFill>
+                  </a:tcPr>
+                </a:tc>
+                <a:tc>
+                  <a:txBody>
+                    <a:bodyPr/>
+                    <a:lstStyle/>
+                    <a:p>
+                      <a:pPr algn="ctr"/>
+                      <a:r>
+                        <a:rPr lang="en-US" dirty="0" smtClean="0">
+                          <a:solidFill>
+                            <a:srgbClr val="FF0000"/>
+                          </a:solidFill>
+                        </a:rPr>
+                        <a:t>14</a:t>
+                      </a:r>
+                      <a:endParaRPr lang="en-US" dirty="0">
+                        <a:solidFill>
+                          <a:srgbClr val="FF0000"/>
+                        </a:solidFill>
+                      </a:endParaRPr>
+                    </a:p>
+                  </a:txBody>
+                  <a:tcPr>
+                    <a:lnL w="12700" cap="flat" cmpd="sng" algn="ctr">
+                      <a:solidFill>
+                        <a:schemeClr val="tx1"/>
+                      </a:solidFill>
+                      <a:prstDash val="solid"/>
+                      <a:round/>
+                      <a:headEnd type="none" w="med" len="med"/>
+                      <a:tailEnd type="none" w="med" len="med"/>
+                    </a:lnL>
+                    <a:lnR w="12700" cap="flat" cmpd="sng" algn="ctr">
+                      <a:solidFill>
+                        <a:schemeClr val="tx1"/>
+                      </a:solidFill>
+                      <a:prstDash val="solid"/>
+                      <a:round/>
+                      <a:headEnd type="none" w="med" len="med"/>
+                      <a:tailEnd type="none" w="med" len="med"/>
+                    </a:lnR>
+                    <a:lnT w="12700" cap="flat" cmpd="sng" algn="ctr">
+                      <a:solidFill>
+                        <a:schemeClr val="tx1"/>
+                      </a:solidFill>
+                      <a:prstDash val="solid"/>
+                      <a:round/>
+                      <a:headEnd type="none" w="med" len="med"/>
+                      <a:tailEnd type="none" w="med" len="med"/>
+                    </a:lnT>
+                    <a:lnB w="12700" cap="flat" cmpd="sng" algn="ctr">
+                      <a:solidFill>
+                        <a:schemeClr val="tx1"/>
+                      </a:solidFill>
+                      <a:prstDash val="solid"/>
+                      <a:round/>
+                      <a:headEnd type="none" w="med" len="med"/>
+                      <a:tailEnd type="none" w="med" len="med"/>
+                    </a:lnB>
+                    <a:solidFill>
+                      <a:schemeClr val="bg1">
+                        <a:lumMod val="50000"/>
+                      </a:schemeClr>
+                    </a:solidFill>
+                  </a:tcPr>
+                </a:tc>
+                <a:tc>
+                  <a:txBody>
+                    <a:bodyPr/>
+                    <a:lstStyle/>
+                    <a:p>
+                      <a:pPr algn="ctr"/>
+                      <a:r>
+                        <a:rPr lang="en-US" dirty="0" smtClean="0">
+                          <a:solidFill>
+                            <a:srgbClr val="FF0000"/>
+                          </a:solidFill>
+                        </a:rPr>
+                        <a:t>15</a:t>
+                      </a:r>
+                      <a:endParaRPr lang="en-US" dirty="0">
+                        <a:solidFill>
+                          <a:srgbClr val="FF0000"/>
+                        </a:solidFill>
+                      </a:endParaRPr>
+                    </a:p>
+                  </a:txBody>
+                  <a:tcPr>
+                    <a:lnL w="12700" cap="flat" cmpd="sng" algn="ctr">
+                      <a:solidFill>
+                        <a:schemeClr val="tx1"/>
+                      </a:solidFill>
+                      <a:prstDash val="solid"/>
+                      <a:round/>
+                      <a:headEnd type="none" w="med" len="med"/>
+                      <a:tailEnd type="none" w="med" len="med"/>
+                    </a:lnL>
+                    <a:lnR w="12700" cap="flat" cmpd="sng" algn="ctr">
+                      <a:solidFill>
+                        <a:schemeClr val="tx1"/>
+                      </a:solidFill>
+                      <a:prstDash val="solid"/>
+                      <a:round/>
+                      <a:headEnd type="none" w="med" len="med"/>
+                      <a:tailEnd type="none" w="med" len="med"/>
+                    </a:lnR>
+                    <a:lnT w="12700" cap="flat" cmpd="sng" algn="ctr">
+                      <a:solidFill>
+                        <a:schemeClr val="tx1"/>
+                      </a:solidFill>
+                      <a:prstDash val="solid"/>
+                      <a:round/>
+                      <a:headEnd type="none" w="med" len="med"/>
+                      <a:tailEnd type="none" w="med" len="med"/>
+                    </a:lnT>
+                    <a:lnB w="12700" cap="flat" cmpd="sng" algn="ctr">
+                      <a:solidFill>
+                        <a:schemeClr val="tx1"/>
+                      </a:solidFill>
+                      <a:prstDash val="solid"/>
+                      <a:round/>
+                      <a:headEnd type="none" w="med" len="med"/>
+                      <a:tailEnd type="none" w="med" len="med"/>
+                    </a:lnB>
+                    <a:solidFill>
+                      <a:schemeClr val="bg1">
+                        <a:lumMod val="50000"/>
+                      </a:schemeClr>
+                    </a:solidFill>
+                  </a:tcPr>
+                </a:tc>
+                <a:tc>
+                  <a:txBody>
+                    <a:bodyPr/>
+                    <a:lstStyle/>
+                    <a:p>
+                      <a:pPr algn="ctr"/>
+                      <a:r>
+                        <a:rPr lang="en-US" dirty="0" smtClean="0">
+                          <a:solidFill>
+                            <a:srgbClr val="FF0000"/>
+                          </a:solidFill>
+                        </a:rPr>
+                        <a:t>16</a:t>
+                      </a:r>
+                      <a:endParaRPr lang="en-US" dirty="0">
+                        <a:solidFill>
+                          <a:srgbClr val="FF0000"/>
+                        </a:solidFill>
+                      </a:endParaRPr>
+                    </a:p>
+                  </a:txBody>
+                  <a:tcPr>
+                    <a:lnL w="12700" cap="flat" cmpd="sng" algn="ctr">
+                      <a:solidFill>
+                        <a:schemeClr val="tx1"/>
+                      </a:solidFill>
+                      <a:prstDash val="solid"/>
+                      <a:round/>
+                      <a:headEnd type="none" w="med" len="med"/>
+                      <a:tailEnd type="none" w="med" len="med"/>
+                    </a:lnL>
+                    <a:lnR w="12700" cap="flat" cmpd="sng" algn="ctr">
+                      <a:solidFill>
+                        <a:schemeClr val="tx1"/>
+                      </a:solidFill>
+                      <a:prstDash val="solid"/>
+                      <a:round/>
+                      <a:headEnd type="none" w="med" len="med"/>
+                      <a:tailEnd type="none" w="med" len="med"/>
+                    </a:lnR>
+                    <a:lnT w="12700" cap="flat" cmpd="sng" algn="ctr">
+                      <a:solidFill>
+                        <a:schemeClr val="tx1"/>
+                      </a:solidFill>
+                      <a:prstDash val="solid"/>
+                      <a:round/>
+                      <a:headEnd type="none" w="med" len="med"/>
+                      <a:tailEnd type="none" w="med" len="med"/>
+                    </a:lnT>
+                    <a:lnB w="12700" cap="flat" cmpd="sng" algn="ctr">
+                      <a:solidFill>
+                        <a:schemeClr val="tx1"/>
+                      </a:solidFill>
+                      <a:prstDash val="solid"/>
+                      <a:round/>
+                      <a:headEnd type="none" w="med" len="med"/>
+                      <a:tailEnd type="none" w="med" len="med"/>
+                    </a:lnB>
+                    <a:solidFill>
+                      <a:schemeClr val="bg1">
+                        <a:lumMod val="50000"/>
+                      </a:schemeClr>
+                    </a:solidFill>
+                  </a:tcPr>
+                </a:tc>
+                <a:tc>
+                  <a:txBody>
+                    <a:bodyPr/>
+                    <a:lstStyle/>
+                    <a:p>
+                      <a:pPr algn="ctr"/>
+                      <a:r>
+                        <a:rPr lang="en-US" dirty="0" smtClean="0">
+                          <a:solidFill>
+                            <a:srgbClr val="FF0000"/>
+                          </a:solidFill>
+                        </a:rPr>
+                        <a:t>17</a:t>
+                      </a:r>
+                      <a:endParaRPr lang="en-US" dirty="0">
+                        <a:solidFill>
+                          <a:srgbClr val="FF0000"/>
+                        </a:solidFill>
+                      </a:endParaRPr>
+                    </a:p>
+                  </a:txBody>
+                  <a:tcPr>
+                    <a:lnL w="12700" cap="flat" cmpd="sng" algn="ctr">
+                      <a:solidFill>
+                        <a:schemeClr val="tx1"/>
+                      </a:solidFill>
+                      <a:prstDash val="solid"/>
+                      <a:round/>
+                      <a:headEnd type="none" w="med" len="med"/>
+                      <a:tailEnd type="none" w="med" len="med"/>
+                    </a:lnL>
+                    <a:lnR w="12700" cap="flat" cmpd="sng" algn="ctr">
+                      <a:solidFill>
+                        <a:schemeClr val="tx1"/>
+                      </a:solidFill>
+                      <a:prstDash val="solid"/>
+                      <a:round/>
+                      <a:headEnd type="none" w="med" len="med"/>
+                      <a:tailEnd type="none" w="med" len="med"/>
+                    </a:lnR>
+                    <a:lnT w="12700" cap="flat" cmpd="sng" algn="ctr">
+                      <a:solidFill>
+                        <a:schemeClr val="tx1"/>
+                      </a:solidFill>
+                      <a:prstDash val="solid"/>
+                      <a:round/>
+                      <a:headEnd type="none" w="med" len="med"/>
+                      <a:tailEnd type="none" w="med" len="med"/>
+                    </a:lnT>
+                    <a:lnB w="12700" cap="flat" cmpd="sng" algn="ctr">
+                      <a:solidFill>
+                        <a:schemeClr val="tx1"/>
+                      </a:solidFill>
+                      <a:prstDash val="solid"/>
+                      <a:round/>
+                      <a:headEnd type="none" w="med" len="med"/>
+                      <a:tailEnd type="none" w="med" len="med"/>
+                    </a:lnB>
+                    <a:solidFill>
+                      <a:schemeClr val="bg1">
+                        <a:lumMod val="50000"/>
+                      </a:schemeClr>
+                    </a:solidFill>
+                  </a:tcPr>
+                </a:tc>
+                <a:tc>
+                  <a:txBody>
+                    <a:bodyPr/>
+                    <a:lstStyle/>
+                    <a:p>
+                      <a:pPr algn="ctr"/>
+                      <a:r>
+                        <a:rPr lang="en-US" dirty="0" smtClean="0">
+                          <a:solidFill>
+                            <a:srgbClr val="FF0000"/>
+                          </a:solidFill>
+                        </a:rPr>
+                        <a:t>18</a:t>
+                      </a:r>
+                      <a:endParaRPr lang="en-US" dirty="0">
+                        <a:solidFill>
+                          <a:srgbClr val="FF0000"/>
+                        </a:solidFill>
+                      </a:endParaRPr>
+                    </a:p>
+                  </a:txBody>
+                  <a:tcPr>
+                    <a:lnL w="12700" cap="flat" cmpd="sng" algn="ctr">
+                      <a:solidFill>
+                        <a:schemeClr val="tx1"/>
+                      </a:solidFill>
+                      <a:prstDash val="solid"/>
+                      <a:round/>
+                      <a:headEnd type="none" w="med" len="med"/>
+                      <a:tailEnd type="none" w="med" len="med"/>
+                    </a:lnL>
+                    <a:lnR w="12700" cap="flat" cmpd="sng" algn="ctr">
+                      <a:solidFill>
+                        <a:schemeClr val="tx1"/>
+                      </a:solidFill>
+                      <a:prstDash val="solid"/>
+                      <a:round/>
+                      <a:headEnd type="none" w="med" len="med"/>
+                      <a:tailEnd type="none" w="med" len="med"/>
+                    </a:lnR>
+                    <a:lnT w="12700" cap="flat" cmpd="sng" algn="ctr">
+                      <a:solidFill>
+                        <a:schemeClr val="tx1"/>
+                      </a:solidFill>
+                      <a:prstDash val="solid"/>
+                      <a:round/>
+                      <a:headEnd type="none" w="med" len="med"/>
+                      <a:tailEnd type="none" w="med" len="med"/>
+                    </a:lnT>
+                    <a:lnB w="12700" cap="flat" cmpd="sng" algn="ctr">
+                      <a:solidFill>
+                        <a:schemeClr val="tx1"/>
+                      </a:solidFill>
+                      <a:prstDash val="solid"/>
+                      <a:round/>
+                      <a:headEnd type="none" w="med" len="med"/>
+                      <a:tailEnd type="none" w="med" len="med"/>
+                    </a:lnB>
+                    <a:solidFill>
+                      <a:schemeClr val="bg1">
+                        <a:lumMod val="50000"/>
+                      </a:schemeClr>
+                    </a:solidFill>
+                  </a:tcPr>
+                </a:tc>
+                <a:tc>
+                  <a:txBody>
+                    <a:bodyPr/>
+                    <a:lstStyle/>
+                    <a:p>
+                      <a:pPr algn="ctr"/>
+                      <a:r>
+                        <a:rPr lang="en-US" dirty="0" smtClean="0">
+                          <a:solidFill>
+                            <a:srgbClr val="FF0000"/>
+                          </a:solidFill>
+                        </a:rPr>
+                        <a:t>19</a:t>
+                      </a:r>
+                      <a:endParaRPr lang="en-US" dirty="0">
+                        <a:solidFill>
+                          <a:srgbClr val="FF0000"/>
+                        </a:solidFill>
+                      </a:endParaRPr>
+                    </a:p>
+                  </a:txBody>
+                  <a:tcPr>
+                    <a:lnL w="12700" cap="flat" cmpd="sng" algn="ctr">
+                      <a:solidFill>
+                        <a:schemeClr val="tx1"/>
+                      </a:solidFill>
+                      <a:prstDash val="solid"/>
+                      <a:round/>
+                      <a:headEnd type="none" w="med" len="med"/>
+                      <a:tailEnd type="none" w="med" len="med"/>
+                    </a:lnL>
+                    <a:lnR w="12700" cap="flat" cmpd="sng" algn="ctr">
+                      <a:solidFill>
+                        <a:schemeClr val="tx1"/>
+                      </a:solidFill>
+                      <a:prstDash val="solid"/>
+                      <a:round/>
+                      <a:headEnd type="none" w="med" len="med"/>
+                      <a:tailEnd type="none" w="med" len="med"/>
+                    </a:lnR>
+                    <a:lnT w="12700" cap="flat" cmpd="sng" algn="ctr">
+                      <a:solidFill>
+                        <a:schemeClr val="tx1"/>
+                      </a:solidFill>
+                      <a:prstDash val="solid"/>
+                      <a:round/>
+                      <a:headEnd type="none" w="med" len="med"/>
+                      <a:tailEnd type="none" w="med" len="med"/>
+                    </a:lnT>
+                    <a:lnB w="12700" cap="flat" cmpd="sng" algn="ctr">
+                      <a:solidFill>
+                        <a:schemeClr val="tx1"/>
+                      </a:solidFill>
+                      <a:prstDash val="solid"/>
+                      <a:round/>
+                      <a:headEnd type="none" w="med" len="med"/>
+                      <a:tailEnd type="none" w="med" len="med"/>
+                    </a:lnB>
+                    <a:solidFill>
+                      <a:schemeClr val="bg1">
+                        <a:lumMod val="50000"/>
+                      </a:schemeClr>
+                    </a:solidFill>
+                  </a:tcPr>
+                </a:tc>
+                <a:tc>
+                  <a:txBody>
+                    <a:bodyPr/>
+                    <a:lstStyle/>
+                    <a:p>
+                      <a:pPr algn="ctr"/>
+                      <a:r>
+                        <a:rPr lang="en-US" dirty="0" smtClean="0">
+                          <a:solidFill>
+                            <a:srgbClr val="FF0000"/>
+                          </a:solidFill>
+                        </a:rPr>
+                        <a:t>20</a:t>
+                      </a:r>
+                      <a:endParaRPr lang="en-US" dirty="0">
+                        <a:solidFill>
+                          <a:srgbClr val="FF0000"/>
+                        </a:solidFill>
+                      </a:endParaRPr>
+                    </a:p>
+                  </a:txBody>
+                  <a:tcPr>
+                    <a:lnL w="12700" cap="flat" cmpd="sng" algn="ctr">
+                      <a:solidFill>
+                        <a:schemeClr val="tx1"/>
+                      </a:solidFill>
+                      <a:prstDash val="solid"/>
+                      <a:round/>
+                      <a:headEnd type="none" w="med" len="med"/>
+                      <a:tailEnd type="none" w="med" len="med"/>
+                    </a:lnL>
+                    <a:lnR w="12700" cap="flat" cmpd="sng" algn="ctr">
+                      <a:solidFill>
+                        <a:schemeClr val="tx1"/>
+                      </a:solidFill>
+                      <a:prstDash val="solid"/>
+                      <a:round/>
+                      <a:headEnd type="none" w="med" len="med"/>
+                      <a:tailEnd type="none" w="med" len="med"/>
+                    </a:lnR>
+                    <a:lnT w="12700" cap="flat" cmpd="sng" algn="ctr">
+                      <a:solidFill>
+                        <a:schemeClr val="tx1"/>
+                      </a:solidFill>
+                      <a:prstDash val="solid"/>
+                      <a:round/>
+                      <a:headEnd type="none" w="med" len="med"/>
+                      <a:tailEnd type="none" w="med" len="med"/>
+                    </a:lnT>
+                    <a:lnB w="12700" cap="flat" cmpd="sng" algn="ctr">
+                      <a:solidFill>
+                        <a:schemeClr val="tx1"/>
+                      </a:solidFill>
+                      <a:prstDash val="solid"/>
+                      <a:round/>
+                      <a:headEnd type="none" w="med" len="med"/>
+                      <a:tailEnd type="none" w="med" len="med"/>
+                    </a:lnB>
+                    <a:solidFill>
+                      <a:schemeClr val="bg1">
+                        <a:lumMod val="50000"/>
+                      </a:schemeClr>
+                    </a:solidFill>
+                  </a:tcPr>
+                </a:tc>
+                <a:tc>
+                  <a:txBody>
+                    <a:bodyPr/>
+                    <a:lstStyle/>
+                    <a:p>
+                      <a:pPr algn="ctr"/>
+                      <a:r>
+                        <a:rPr lang="en-US" dirty="0" smtClean="0">
+                          <a:solidFill>
+                            <a:srgbClr val="FF0000"/>
+                          </a:solidFill>
+                        </a:rPr>
+                        <a:t>21</a:t>
+                      </a:r>
+                      <a:endParaRPr lang="en-US" dirty="0">
+                        <a:solidFill>
+                          <a:srgbClr val="FF0000"/>
+                        </a:solidFill>
+                      </a:endParaRPr>
+                    </a:p>
+                  </a:txBody>
+                  <a:tcPr>
+                    <a:lnL w="12700" cap="flat" cmpd="sng" algn="ctr">
+                      <a:solidFill>
+                        <a:schemeClr val="tx1"/>
+                      </a:solidFill>
+                      <a:prstDash val="solid"/>
+                      <a:round/>
+                      <a:headEnd type="none" w="med" len="med"/>
+                      <a:tailEnd type="none" w="med" len="med"/>
+                    </a:lnL>
+                    <a:lnR w="12700" cap="flat" cmpd="sng" algn="ctr">
+                      <a:solidFill>
+                        <a:schemeClr val="tx1"/>
+                      </a:solidFill>
+                      <a:prstDash val="solid"/>
+                      <a:round/>
+                      <a:headEnd type="none" w="med" len="med"/>
+                      <a:tailEnd type="none" w="med" len="med"/>
+                    </a:lnR>
+                    <a:lnT w="12700" cap="flat" cmpd="sng" algn="ctr">
+                      <a:solidFill>
+                        <a:schemeClr val="tx1"/>
+                      </a:solidFill>
+                      <a:prstDash val="solid"/>
+                      <a:round/>
+                      <a:headEnd type="none" w="med" len="med"/>
+                      <a:tailEnd type="none" w="med" len="med"/>
+                    </a:lnT>
+                    <a:lnB w="12700" cap="flat" cmpd="sng" algn="ctr">
+                      <a:solidFill>
+                        <a:schemeClr val="tx1"/>
+                      </a:solidFill>
+                      <a:prstDash val="solid"/>
+                      <a:round/>
+                      <a:headEnd type="none" w="med" len="med"/>
+                      <a:tailEnd type="none" w="med" len="med"/>
+                    </a:lnB>
+                    <a:solidFill>
+                      <a:schemeClr val="bg1">
+                        <a:lumMod val="50000"/>
+                      </a:schemeClr>
+                    </a:solidFill>
+                  </a:tcPr>
+                </a:tc>
+                <a:tc>
+                  <a:txBody>
+                    <a:bodyPr/>
+                    <a:lstStyle/>
+                    <a:p>
+                      <a:pPr algn="ctr"/>
+                      <a:r>
+                        <a:rPr lang="en-US" dirty="0" smtClean="0">
+                          <a:solidFill>
+                            <a:srgbClr val="FF0000"/>
+                          </a:solidFill>
+                        </a:rPr>
+                        <a:t>22</a:t>
+                      </a:r>
+                      <a:endParaRPr lang="en-US" dirty="0">
+                        <a:solidFill>
+                          <a:srgbClr val="FF0000"/>
+                        </a:solidFill>
+                      </a:endParaRPr>
+                    </a:p>
+                  </a:txBody>
+                  <a:tcPr>
+                    <a:lnL w="12700" cap="flat" cmpd="sng" algn="ctr">
+                      <a:solidFill>
+                        <a:schemeClr val="tx1"/>
+                      </a:solidFill>
+                      <a:prstDash val="solid"/>
+                      <a:round/>
+                      <a:headEnd type="none" w="med" len="med"/>
+                      <a:tailEnd type="none" w="med" len="med"/>
+                    </a:lnL>
+                    <a:lnR w="12700" cap="flat" cmpd="sng" algn="ctr">
+                      <a:noFill/>
+                      <a:prstDash val="solid"/>
+                      <a:round/>
+                      <a:headEnd type="none" w="med" len="med"/>
+                      <a:tailEnd type="none" w="med" len="med"/>
+                    </a:lnR>
+                    <a:lnT w="12700" cap="flat" cmpd="sng" algn="ctr">
+                      <a:solidFill>
+                        <a:schemeClr val="tx1"/>
+                      </a:solidFill>
+                      <a:prstDash val="solid"/>
+                      <a:round/>
+                      <a:headEnd type="none" w="med" len="med"/>
+                      <a:tailEnd type="none" w="med" len="med"/>
+                    </a:lnT>
+                    <a:lnB w="12700" cap="flat" cmpd="sng" algn="ctr">
+                      <a:solidFill>
+                        <a:schemeClr val="tx1"/>
+                      </a:solidFill>
+                      <a:prstDash val="solid"/>
+                      <a:round/>
+                      <a:headEnd type="none" w="med" len="med"/>
+                      <a:tailEnd type="none" w="med" len="med"/>
+                    </a:lnB>
+                    <a:solidFill>
+                      <a:schemeClr val="bg1">
+                        <a:lumMod val="50000"/>
+                      </a:schemeClr>
+                    </a:solidFill>
+                  </a:tcPr>
+                </a:tc>
+              </a:tr>
+            </a:tbl>
+          </a:graphicData>
+        </a:graphic>
+      </p:graphicFrame>
+      <p:sp>
+        <p:nvSpPr>
+          <p:cNvPr id="8" name="Title 1"/>
+          <p:cNvSpPr>
+            <a:spLocks noGrp="1"/>
+          </p:cNvSpPr>
+          <p:nvPr>
+            <p:ph type="title"/>
+          </p:nvPr>
+        </p:nvSpPr>
+        <p:spPr>
+          <a:xfrm>
+            <a:off x="65088" y="122238"/>
+            <a:ext cx="9012237" cy="868362"/>
+          </a:xfrm>
+        </p:spPr>
+        <p:txBody>
+          <a:bodyPr/>
+          <a:lstStyle/>
+          <a:p>
+            <a:r>
+              <a:rPr lang="en-US" dirty="0"/>
+              <a:t>Length Limits –</a:t>
+            </a:r>
+            <a:r>
+              <a:rPr lang="en-US" dirty="0" smtClean="0"/>
+              <a:t> Maximum</a:t>
+            </a:r>
+            <a:endParaRPr lang="en-US" dirty="0"/>
+          </a:p>
+        </p:txBody>
+      </p:sp>
+    </p:spTree>
+    <p:extLst>
+      <p:ext uri="{BB962C8B-B14F-4D97-AF65-F5344CB8AC3E}">
+        <p14:creationId xmlns:p14="http://schemas.microsoft.com/office/powerpoint/2010/main" val="1360340537"/>
+      </p:ext>
+    </p:extLst>
+  </p:cSld>
+  <p:clrMapOvr>
+    <a:masterClrMapping/>
+  </p:clrMapOvr>
+  <mc:AlternateContent xmlns:mc="http://schemas.openxmlformats.org/markup-compatibility/2006" xmlns:p14="http://schemas.microsoft.com/office/powerpoint/2010/main">
+    <mc:Choice Requires="p14">
+      <p:transition spd="slow" p14:dur="2000"/>
+    </mc:Choice>
+    <mc:Fallback xmlns="">
+      <p:transition spd="slow"/>
+    </mc:Fallback>
+  </mc:AlternateContent>
+  <p:timing>
+    <p:tnLst>
+      <p:par>
+        <p:cTn id="1" dur="indefinite" restart="never" nodeType="tmRoot">
+          <p:childTnLst>
+            <p:seq concurrent="1" nextAc="seek">
+              <p:cTn id="2" dur="indefinite" nodeType="mainSeq">
+                <p:childTnLst>
+                  <p:par>
+                    <p:cTn id="3" fill="hold">
+                      <p:stCondLst>
+                        <p:cond delay="indefinite"/>
+                      </p:stCondLst>
+                      <p:childTnLst>
+                        <p:par>
+                          <p:cTn id="4" fill="hold">
+                            <p:stCondLst>
+                              <p:cond delay="0"/>
+                            </p:stCondLst>
+                            <p:childTnLst>
+                              <p:par>
+                                <p:cTn id="5" presetID="1" presetClass="entr" presetSubtype="0" fill="hold" grpId="0" nodeType="clickEffect">
+                                  <p:stCondLst>
+                                    <p:cond delay="0"/>
+                                  </p:stCondLst>
+                                  <p:childTnLst>
+                                    <p:set>
+                                      <p:cBhvr>
+                                        <p:cTn id="6" dur="1" fill="hold">
+                                          <p:stCondLst>
+                                            <p:cond delay="0"/>
+                                          </p:stCondLst>
+                                        </p:cTn>
+                                        <p:tgtEl>
+                                          <p:spTgt spid="3">
+                                            <p:txEl>
+                                              <p:pRg st="1" end="1"/>
+                                            </p:txEl>
+                                          </p:spTgt>
+                                        </p:tgtEl>
+                                        <p:attrNameLst>
+                                          <p:attrName>style.visibility</p:attrName>
+                                        </p:attrNameLst>
+                                      </p:cBhvr>
+                                      <p:to>
+                                        <p:strVal val="visible"/>
+                                      </p:to>
+                                    </p:set>
+                                  </p:childTnLst>
+                                </p:cTn>
+                              </p:par>
+                            </p:childTnLst>
+                          </p:cTn>
+                        </p:par>
+                      </p:childTnLst>
+                    </p:cTn>
+                  </p:par>
+                  <p:par>
+                    <p:cTn id="7" fill="hold">
+                      <p:stCondLst>
+                        <p:cond delay="indefinite"/>
+                      </p:stCondLst>
+                      <p:childTnLst>
+                        <p:par>
+                          <p:cTn id="8" fill="hold">
+                            <p:stCondLst>
+                              <p:cond delay="0"/>
+                            </p:stCondLst>
+                            <p:childTnLst>
+                              <p:par>
+                                <p:cTn id="9" presetID="1" presetClass="entr" presetSubtype="0" fill="hold" grpId="0" nodeType="clickEffect">
+                                  <p:stCondLst>
+                                    <p:cond delay="0"/>
+                                  </p:stCondLst>
+                                  <p:childTnLst>
+                                    <p:set>
+                                      <p:cBhvr>
+                                        <p:cTn id="10" dur="1" fill="hold">
+                                          <p:stCondLst>
+                                            <p:cond delay="0"/>
+                                          </p:stCondLst>
+                                        </p:cTn>
+                                        <p:tgtEl>
+                                          <p:spTgt spid="3">
+                                            <p:txEl>
+                                              <p:pRg st="2" end="2"/>
+                                            </p:txEl>
+                                          </p:spTgt>
+                                        </p:tgtEl>
+                                        <p:attrNameLst>
+                                          <p:attrName>style.visibility</p:attrName>
+                                        </p:attrNameLst>
+                                      </p:cBhvr>
+                                      <p:to>
+                                        <p:strVal val="visible"/>
+                                      </p:to>
+                                    </p:set>
+                                  </p:childTnLst>
+                                </p:cTn>
+                              </p:par>
+                            </p:childTnLst>
+                          </p:cTn>
+                        </p:par>
+                      </p:childTnLst>
+                    </p:cTn>
+                  </p:par>
+                  <p:par>
+                    <p:cTn id="11" fill="hold">
+                      <p:stCondLst>
+                        <p:cond delay="indefinite"/>
+                      </p:stCondLst>
+                      <p:childTnLst>
+                        <p:par>
+                          <p:cTn id="12" fill="hold">
+                            <p:stCondLst>
+                              <p:cond delay="0"/>
+                            </p:stCondLst>
+                            <p:childTnLst>
+                              <p:par>
+                                <p:cTn id="13" presetID="1" presetClass="entr" presetSubtype="0" fill="hold" grpId="0" nodeType="clickEffect">
+                                  <p:stCondLst>
+                                    <p:cond delay="0"/>
+                                  </p:stCondLst>
+                                  <p:childTnLst>
+                                    <p:set>
+                                      <p:cBhvr>
+                                        <p:cTn id="14" dur="1" fill="hold">
+                                          <p:stCondLst>
+                                            <p:cond delay="0"/>
+                                          </p:stCondLst>
+                                        </p:cTn>
+                                        <p:tgtEl>
+                                          <p:spTgt spid="3">
+                                            <p:txEl>
+                                              <p:pRg st="3" end="3"/>
+                                            </p:txEl>
+                                          </p:spTgt>
+                                        </p:tgtEl>
+                                        <p:attrNameLst>
+                                          <p:attrName>style.visibility</p:attrName>
+                                        </p:attrNameLst>
+                                      </p:cBhvr>
+                                      <p:to>
+                                        <p:strVal val="visible"/>
+                                      </p:to>
+                                    </p:set>
+                                  </p:childTnLst>
+                                </p:cTn>
+                              </p:par>
+                            </p:childTnLst>
+                          </p:cTn>
+                        </p:par>
+                      </p:childTnLst>
+                    </p:cTn>
+                  </p:par>
+                </p:childTnLst>
+              </p:cTn>
+              <p:prevCondLst>
+                <p:cond evt="onPrev" delay="0">
+                  <p:tgtEl>
+                    <p:sldTgt/>
+                  </p:tgtEl>
+                </p:cond>
+              </p:prevCondLst>
+              <p:nextCondLst>
+                <p:cond evt="onNext" delay="0">
+                  <p:tgtEl>
+                    <p:sldTgt/>
+                  </p:tgtEl>
+                </p:cond>
+              </p:nextCondLst>
+            </p:seq>
+          </p:childTnLst>
+        </p:cTn>
+      </p:par>
+    </p:tnLst>
+    <p:bldLst>
+      <p:bldP spid="3" grpId="0" build="p"/>
+    </p:bldLst>
+  </p:timing>
+</p:sld>
+</file>
+
 <file path=ppt/slides/slide2.xml><?xml version="1.0" encoding="utf-8"?>
 <p:sld xmlns:a="http://schemas.openxmlformats.org/drawingml/2006/main" xmlns:r="http://schemas.openxmlformats.org/officeDocument/2006/relationships" xmlns:p="http://schemas.openxmlformats.org/presentationml/2006/main">
   <p:cSld>
@@ -13841,13 +15418,7 @@
               <a:rPr lang="en-US" dirty="0" smtClean="0">
                 <a:hlinkClick r:id="rId4"/>
               </a:rPr>
-              <a:t>But </a:t>
-            </a:r>
-            <a:r>
-              <a:rPr lang="en-US" dirty="0" smtClean="0">
-                <a:hlinkClick r:id="rId4"/>
-              </a:rPr>
-              <a:t>also see this!</a:t>
+              <a:t>But also see this!</a:t>
             </a:r>
             <a:r>
               <a:rPr lang="en-US" dirty="0"/>
@@ -13859,13 +15430,8 @@
             </a:r>
             <a:r>
               <a:rPr lang="en-US" sz="1400" dirty="0" smtClean="0"/>
-              <a:t>0:00-0:50</a:t>
+              <a:t>0:00-0:50)</a:t>
             </a:r>
-            <a:r>
-              <a:rPr lang="en-US" sz="1400" dirty="0" smtClean="0"/>
-              <a:t>)</a:t>
-            </a:r>
-            <a:endParaRPr lang="en-US" sz="1400" dirty="0" smtClean="0"/>
           </a:p>
           <a:p>
             <a:r>
@@ -15992,6 +17558,1608 @@
         <p:spPr>
           <a:xfrm>
             <a:off x="228600" y="1828800"/>
+            <a:ext cx="8991600" cy="2895600"/>
+          </a:xfrm>
+        </p:spPr>
+        <p:txBody>
+          <a:bodyPr/>
+          <a:lstStyle/>
+          <a:p>
+            <a:r>
+              <a:rPr lang="en-US" dirty="0" smtClean="0"/>
+              <a:t>Recommended when …</a:t>
+            </a:r>
+          </a:p>
+          <a:p>
+            <a:pPr lvl="1"/>
+            <a:r>
+              <a:rPr lang="en-US" dirty="0" smtClean="0"/>
+              <a:t>High rates of recruitment.</a:t>
+            </a:r>
+          </a:p>
+          <a:p>
+            <a:pPr lvl="1"/>
+            <a:r>
+              <a:rPr lang="en-US" dirty="0" smtClean="0"/>
+              <a:t>Low rates of growth.</a:t>
+            </a:r>
+          </a:p>
+          <a:p>
+            <a:pPr lvl="1"/>
+            <a:r>
+              <a:rPr lang="en-US" dirty="0" smtClean="0"/>
+              <a:t>Desire more quality fish.</a:t>
+            </a:r>
+          </a:p>
+          <a:p>
+            <a:pPr lvl="1"/>
+            <a:endParaRPr lang="en-US" dirty="0"/>
+          </a:p>
+          <a:p>
+            <a:r>
+              <a:rPr lang="en-US" dirty="0">
+                <a:hlinkClick r:id="rId3"/>
+              </a:rPr>
+              <a:t>C</a:t>
+            </a:r>
+            <a:r>
+              <a:rPr lang="en-US" dirty="0" smtClean="0">
+                <a:hlinkClick r:id="rId3"/>
+              </a:rPr>
+              <a:t>heck this out!</a:t>
+            </a:r>
+            <a:r>
+              <a:rPr lang="en-US" dirty="0" smtClean="0"/>
+              <a:t> </a:t>
+            </a:r>
+            <a:r>
+              <a:rPr lang="en-US" sz="1400" dirty="0"/>
+              <a:t>(0:31-2:18)</a:t>
+            </a:r>
+          </a:p>
+          <a:p>
+            <a:r>
+              <a:rPr lang="en-US" dirty="0" smtClean="0">
+                <a:hlinkClick r:id="rId4"/>
+              </a:rPr>
+              <a:t>And </a:t>
+            </a:r>
+            <a:r>
+              <a:rPr lang="en-US" dirty="0" smtClean="0">
+                <a:hlinkClick r:id="rId4"/>
+              </a:rPr>
+              <a:t>note this!</a:t>
+            </a:r>
+            <a:r>
+              <a:rPr lang="en-US" sz="1400" dirty="0" smtClean="0"/>
+              <a:t> </a:t>
+            </a:r>
+            <a:r>
+              <a:rPr lang="en-US" sz="1400" dirty="0"/>
+              <a:t>(0:45-3:30)</a:t>
+            </a:r>
+            <a:endParaRPr lang="en-US" dirty="0"/>
+          </a:p>
+          <a:p>
+            <a:endParaRPr lang="en-US" dirty="0" smtClean="0"/>
+          </a:p>
+        </p:txBody>
+      </p:sp>
+      <p:sp>
+        <p:nvSpPr>
+          <p:cNvPr id="4" name="Footer Placeholder 3"/>
+          <p:cNvSpPr>
+            <a:spLocks noGrp="1"/>
+          </p:cNvSpPr>
+          <p:nvPr>
+            <p:ph type="ftr" sz="quarter" idx="10"/>
+          </p:nvPr>
+        </p:nvSpPr>
+        <p:spPr/>
+        <p:txBody>
+          <a:bodyPr/>
+          <a:lstStyle/>
+          <a:p>
+            <a:r>
+              <a:rPr lang="en-US" smtClean="0"/>
+              <a:t>Management Regulations</a:t>
+            </a:r>
+            <a:endParaRPr lang="en-US"/>
+          </a:p>
+        </p:txBody>
+      </p:sp>
+      <p:sp>
+        <p:nvSpPr>
+          <p:cNvPr id="5" name="Slide Number Placeholder 4"/>
+          <p:cNvSpPr>
+            <a:spLocks noGrp="1"/>
+          </p:cNvSpPr>
+          <p:nvPr>
+            <p:ph type="sldNum" sz="quarter" idx="11"/>
+          </p:nvPr>
+        </p:nvSpPr>
+        <p:spPr/>
+        <p:txBody>
+          <a:bodyPr/>
+          <a:lstStyle/>
+          <a:p>
+            <a:fld id="{1885BB51-0796-4632-BDB9-6CE403630838}" type="slidenum">
+              <a:rPr lang="en-US" smtClean="0"/>
+              <a:pPr/>
+              <a:t>8</a:t>
+            </a:fld>
+            <a:endParaRPr lang="en-US"/>
+          </a:p>
+        </p:txBody>
+      </p:sp>
+      <p:sp>
+        <p:nvSpPr>
+          <p:cNvPr id="7" name="Title 1"/>
+          <p:cNvSpPr>
+            <a:spLocks noGrp="1"/>
+          </p:cNvSpPr>
+          <p:nvPr>
+            <p:ph type="title"/>
+          </p:nvPr>
+        </p:nvSpPr>
+        <p:spPr>
+          <a:xfrm>
+            <a:off x="65088" y="122238"/>
+            <a:ext cx="9012237" cy="868362"/>
+          </a:xfrm>
+        </p:spPr>
+        <p:txBody>
+          <a:bodyPr/>
+          <a:lstStyle/>
+          <a:p>
+            <a:r>
+              <a:rPr lang="en-US" dirty="0"/>
+              <a:t>Length Limits – Protected Slot</a:t>
+            </a:r>
+          </a:p>
+        </p:txBody>
+      </p:sp>
+      <p:graphicFrame>
+        <p:nvGraphicFramePr>
+          <p:cNvPr id="8" name="Content Placeholder 5"/>
+          <p:cNvGraphicFramePr>
+            <a:graphicFrameLocks/>
+          </p:cNvGraphicFramePr>
+          <p:nvPr>
+            <p:extLst/>
+          </p:nvPr>
+        </p:nvGraphicFramePr>
+        <p:xfrm>
+          <a:off x="457200" y="990600"/>
+          <a:ext cx="8229581" cy="370840"/>
+        </p:xfrm>
+        <a:graphic>
+          <a:graphicData uri="http://schemas.openxmlformats.org/drawingml/2006/table">
+            <a:tbl>
+              <a:tblPr firstRow="1" bandRow="1">
+                <a:tableStyleId>{5C22544A-7EE6-4342-B048-85BDC9FD1C3A}</a:tableStyleId>
+              </a:tblPr>
+              <a:tblGrid>
+                <a:gridCol w="484093"/>
+                <a:gridCol w="484093"/>
+                <a:gridCol w="484093"/>
+                <a:gridCol w="484093"/>
+                <a:gridCol w="484093"/>
+                <a:gridCol w="484093"/>
+                <a:gridCol w="484093"/>
+                <a:gridCol w="484093"/>
+                <a:gridCol w="484093"/>
+                <a:gridCol w="484093"/>
+                <a:gridCol w="484093"/>
+                <a:gridCol w="484093"/>
+                <a:gridCol w="484093"/>
+                <a:gridCol w="484093"/>
+                <a:gridCol w="484093"/>
+                <a:gridCol w="484093"/>
+                <a:gridCol w="484093"/>
+              </a:tblGrid>
+              <a:tr h="370840">
+                <a:tc>
+                  <a:txBody>
+                    <a:bodyPr/>
+                    <a:lstStyle/>
+                    <a:p>
+                      <a:pPr algn="ctr"/>
+                      <a:r>
+                        <a:rPr lang="en-US" dirty="0" smtClean="0">
+                          <a:solidFill>
+                            <a:schemeClr val="tx1"/>
+                          </a:solidFill>
+                        </a:rPr>
+                        <a:t>6</a:t>
+                      </a:r>
+                      <a:endParaRPr lang="en-US" dirty="0">
+                        <a:solidFill>
+                          <a:schemeClr val="tx1"/>
+                        </a:solidFill>
+                      </a:endParaRPr>
+                    </a:p>
+                  </a:txBody>
+                  <a:tcPr>
+                    <a:lnL w="12700" cap="flat" cmpd="sng" algn="ctr">
+                      <a:noFill/>
+                      <a:prstDash val="solid"/>
+                      <a:round/>
+                      <a:headEnd type="none" w="med" len="med"/>
+                      <a:tailEnd type="none" w="med" len="med"/>
+                    </a:lnL>
+                    <a:lnR w="12700" cap="flat" cmpd="sng" algn="ctr">
+                      <a:solidFill>
+                        <a:schemeClr val="tx1"/>
+                      </a:solidFill>
+                      <a:prstDash val="solid"/>
+                      <a:round/>
+                      <a:headEnd type="none" w="med" len="med"/>
+                      <a:tailEnd type="none" w="med" len="med"/>
+                    </a:lnR>
+                    <a:lnT w="12700" cap="flat" cmpd="sng" algn="ctr">
+                      <a:solidFill>
+                        <a:schemeClr val="tx1"/>
+                      </a:solidFill>
+                      <a:prstDash val="solid"/>
+                      <a:round/>
+                      <a:headEnd type="none" w="med" len="med"/>
+                      <a:tailEnd type="none" w="med" len="med"/>
+                    </a:lnT>
+                    <a:lnB w="12700" cap="flat" cmpd="sng" algn="ctr">
+                      <a:solidFill>
+                        <a:schemeClr val="tx1"/>
+                      </a:solidFill>
+                      <a:prstDash val="solid"/>
+                      <a:round/>
+                      <a:headEnd type="none" w="med" len="med"/>
+                      <a:tailEnd type="none" w="med" len="med"/>
+                    </a:lnB>
+                    <a:solidFill>
+                      <a:schemeClr val="bg1"/>
+                    </a:solidFill>
+                  </a:tcPr>
+                </a:tc>
+                <a:tc>
+                  <a:txBody>
+                    <a:bodyPr/>
+                    <a:lstStyle/>
+                    <a:p>
+                      <a:pPr algn="ctr"/>
+                      <a:r>
+                        <a:rPr lang="en-US" dirty="0" smtClean="0">
+                          <a:solidFill>
+                            <a:schemeClr val="tx1"/>
+                          </a:solidFill>
+                        </a:rPr>
+                        <a:t>7</a:t>
+                      </a:r>
+                      <a:endParaRPr lang="en-US" dirty="0">
+                        <a:solidFill>
+                          <a:schemeClr val="tx1"/>
+                        </a:solidFill>
+                      </a:endParaRPr>
+                    </a:p>
+                  </a:txBody>
+                  <a:tcPr>
+                    <a:lnL w="12700" cap="flat" cmpd="sng" algn="ctr">
+                      <a:solidFill>
+                        <a:schemeClr val="tx1"/>
+                      </a:solidFill>
+                      <a:prstDash val="solid"/>
+                      <a:round/>
+                      <a:headEnd type="none" w="med" len="med"/>
+                      <a:tailEnd type="none" w="med" len="med"/>
+                    </a:lnL>
+                    <a:lnR w="12700" cap="flat" cmpd="sng" algn="ctr">
+                      <a:solidFill>
+                        <a:schemeClr val="tx1"/>
+                      </a:solidFill>
+                      <a:prstDash val="solid"/>
+                      <a:round/>
+                      <a:headEnd type="none" w="med" len="med"/>
+                      <a:tailEnd type="none" w="med" len="med"/>
+                    </a:lnR>
+                    <a:lnT w="12700" cap="flat" cmpd="sng" algn="ctr">
+                      <a:solidFill>
+                        <a:schemeClr val="tx1"/>
+                      </a:solidFill>
+                      <a:prstDash val="solid"/>
+                      <a:round/>
+                      <a:headEnd type="none" w="med" len="med"/>
+                      <a:tailEnd type="none" w="med" len="med"/>
+                    </a:lnT>
+                    <a:lnB w="12700" cap="flat" cmpd="sng" algn="ctr">
+                      <a:solidFill>
+                        <a:schemeClr val="tx1"/>
+                      </a:solidFill>
+                      <a:prstDash val="solid"/>
+                      <a:round/>
+                      <a:headEnd type="none" w="med" len="med"/>
+                      <a:tailEnd type="none" w="med" len="med"/>
+                    </a:lnB>
+                    <a:solidFill>
+                      <a:schemeClr val="bg1"/>
+                    </a:solidFill>
+                  </a:tcPr>
+                </a:tc>
+                <a:tc>
+                  <a:txBody>
+                    <a:bodyPr/>
+                    <a:lstStyle/>
+                    <a:p>
+                      <a:pPr algn="ctr"/>
+                      <a:r>
+                        <a:rPr lang="en-US" dirty="0" smtClean="0">
+                          <a:solidFill>
+                            <a:schemeClr val="tx1"/>
+                          </a:solidFill>
+                        </a:rPr>
+                        <a:t>8</a:t>
+                      </a:r>
+                      <a:endParaRPr lang="en-US" dirty="0">
+                        <a:solidFill>
+                          <a:schemeClr val="tx1"/>
+                        </a:solidFill>
+                      </a:endParaRPr>
+                    </a:p>
+                  </a:txBody>
+                  <a:tcPr>
+                    <a:lnL w="12700" cap="flat" cmpd="sng" algn="ctr">
+                      <a:solidFill>
+                        <a:schemeClr val="tx1"/>
+                      </a:solidFill>
+                      <a:prstDash val="solid"/>
+                      <a:round/>
+                      <a:headEnd type="none" w="med" len="med"/>
+                      <a:tailEnd type="none" w="med" len="med"/>
+                    </a:lnL>
+                    <a:lnR w="12700" cap="flat" cmpd="sng" algn="ctr">
+                      <a:solidFill>
+                        <a:schemeClr val="tx1"/>
+                      </a:solidFill>
+                      <a:prstDash val="solid"/>
+                      <a:round/>
+                      <a:headEnd type="none" w="med" len="med"/>
+                      <a:tailEnd type="none" w="med" len="med"/>
+                    </a:lnR>
+                    <a:lnT w="12700" cap="flat" cmpd="sng" algn="ctr">
+                      <a:solidFill>
+                        <a:schemeClr val="tx1"/>
+                      </a:solidFill>
+                      <a:prstDash val="solid"/>
+                      <a:round/>
+                      <a:headEnd type="none" w="med" len="med"/>
+                      <a:tailEnd type="none" w="med" len="med"/>
+                    </a:lnT>
+                    <a:lnB w="12700" cap="flat" cmpd="sng" algn="ctr">
+                      <a:solidFill>
+                        <a:schemeClr val="tx1"/>
+                      </a:solidFill>
+                      <a:prstDash val="solid"/>
+                      <a:round/>
+                      <a:headEnd type="none" w="med" len="med"/>
+                      <a:tailEnd type="none" w="med" len="med"/>
+                    </a:lnB>
+                    <a:solidFill>
+                      <a:schemeClr val="bg1"/>
+                    </a:solidFill>
+                  </a:tcPr>
+                </a:tc>
+                <a:tc>
+                  <a:txBody>
+                    <a:bodyPr/>
+                    <a:lstStyle/>
+                    <a:p>
+                      <a:pPr algn="ctr"/>
+                      <a:r>
+                        <a:rPr lang="en-US" dirty="0" smtClean="0">
+                          <a:solidFill>
+                            <a:schemeClr val="tx1"/>
+                          </a:solidFill>
+                        </a:rPr>
+                        <a:t>9</a:t>
+                      </a:r>
+                      <a:endParaRPr lang="en-US" dirty="0">
+                        <a:solidFill>
+                          <a:schemeClr val="tx1"/>
+                        </a:solidFill>
+                      </a:endParaRPr>
+                    </a:p>
+                  </a:txBody>
+                  <a:tcPr>
+                    <a:lnL w="12700" cap="flat" cmpd="sng" algn="ctr">
+                      <a:solidFill>
+                        <a:schemeClr val="tx1"/>
+                      </a:solidFill>
+                      <a:prstDash val="solid"/>
+                      <a:round/>
+                      <a:headEnd type="none" w="med" len="med"/>
+                      <a:tailEnd type="none" w="med" len="med"/>
+                    </a:lnL>
+                    <a:lnR w="12700" cap="flat" cmpd="sng" algn="ctr">
+                      <a:solidFill>
+                        <a:schemeClr val="tx1"/>
+                      </a:solidFill>
+                      <a:prstDash val="solid"/>
+                      <a:round/>
+                      <a:headEnd type="none" w="med" len="med"/>
+                      <a:tailEnd type="none" w="med" len="med"/>
+                    </a:lnR>
+                    <a:lnT w="12700" cap="flat" cmpd="sng" algn="ctr">
+                      <a:solidFill>
+                        <a:schemeClr val="tx1"/>
+                      </a:solidFill>
+                      <a:prstDash val="solid"/>
+                      <a:round/>
+                      <a:headEnd type="none" w="med" len="med"/>
+                      <a:tailEnd type="none" w="med" len="med"/>
+                    </a:lnT>
+                    <a:lnB w="12700" cap="flat" cmpd="sng" algn="ctr">
+                      <a:solidFill>
+                        <a:schemeClr val="tx1"/>
+                      </a:solidFill>
+                      <a:prstDash val="solid"/>
+                      <a:round/>
+                      <a:headEnd type="none" w="med" len="med"/>
+                      <a:tailEnd type="none" w="med" len="med"/>
+                    </a:lnB>
+                    <a:solidFill>
+                      <a:schemeClr val="bg1"/>
+                    </a:solidFill>
+                  </a:tcPr>
+                </a:tc>
+                <a:tc>
+                  <a:txBody>
+                    <a:bodyPr/>
+                    <a:lstStyle/>
+                    <a:p>
+                      <a:pPr algn="ctr"/>
+                      <a:r>
+                        <a:rPr lang="en-US" dirty="0" smtClean="0">
+                          <a:solidFill>
+                            <a:schemeClr val="tx1"/>
+                          </a:solidFill>
+                        </a:rPr>
+                        <a:t>10</a:t>
+                      </a:r>
+                      <a:endParaRPr lang="en-US" dirty="0">
+                        <a:solidFill>
+                          <a:schemeClr val="tx1"/>
+                        </a:solidFill>
+                      </a:endParaRPr>
+                    </a:p>
+                  </a:txBody>
+                  <a:tcPr>
+                    <a:lnL w="12700" cap="flat" cmpd="sng" algn="ctr">
+                      <a:solidFill>
+                        <a:schemeClr val="tx1"/>
+                      </a:solidFill>
+                      <a:prstDash val="solid"/>
+                      <a:round/>
+                      <a:headEnd type="none" w="med" len="med"/>
+                      <a:tailEnd type="none" w="med" len="med"/>
+                    </a:lnL>
+                    <a:lnR w="12700" cap="flat" cmpd="sng" algn="ctr">
+                      <a:solidFill>
+                        <a:schemeClr val="tx1"/>
+                      </a:solidFill>
+                      <a:prstDash val="solid"/>
+                      <a:round/>
+                      <a:headEnd type="none" w="med" len="med"/>
+                      <a:tailEnd type="none" w="med" len="med"/>
+                    </a:lnR>
+                    <a:lnT w="12700" cap="flat" cmpd="sng" algn="ctr">
+                      <a:solidFill>
+                        <a:schemeClr val="tx1"/>
+                      </a:solidFill>
+                      <a:prstDash val="solid"/>
+                      <a:round/>
+                      <a:headEnd type="none" w="med" len="med"/>
+                      <a:tailEnd type="none" w="med" len="med"/>
+                    </a:lnT>
+                    <a:lnB w="12700" cap="flat" cmpd="sng" algn="ctr">
+                      <a:solidFill>
+                        <a:schemeClr val="tx1"/>
+                      </a:solidFill>
+                      <a:prstDash val="solid"/>
+                      <a:round/>
+                      <a:headEnd type="none" w="med" len="med"/>
+                      <a:tailEnd type="none" w="med" len="med"/>
+                    </a:lnB>
+                    <a:solidFill>
+                      <a:schemeClr val="bg1"/>
+                    </a:solidFill>
+                  </a:tcPr>
+                </a:tc>
+                <a:tc>
+                  <a:txBody>
+                    <a:bodyPr/>
+                    <a:lstStyle/>
+                    <a:p>
+                      <a:pPr algn="ctr"/>
+                      <a:r>
+                        <a:rPr lang="en-US" dirty="0" smtClean="0">
+                          <a:solidFill>
+                            <a:schemeClr val="tx1"/>
+                          </a:solidFill>
+                        </a:rPr>
+                        <a:t>11</a:t>
+                      </a:r>
+                      <a:endParaRPr lang="en-US" dirty="0">
+                        <a:solidFill>
+                          <a:schemeClr val="tx1"/>
+                        </a:solidFill>
+                      </a:endParaRPr>
+                    </a:p>
+                  </a:txBody>
+                  <a:tcPr>
+                    <a:lnL w="12700" cap="flat" cmpd="sng" algn="ctr">
+                      <a:solidFill>
+                        <a:schemeClr val="tx1"/>
+                      </a:solidFill>
+                      <a:prstDash val="solid"/>
+                      <a:round/>
+                      <a:headEnd type="none" w="med" len="med"/>
+                      <a:tailEnd type="none" w="med" len="med"/>
+                    </a:lnL>
+                    <a:lnR w="12700" cap="flat" cmpd="sng" algn="ctr">
+                      <a:solidFill>
+                        <a:schemeClr val="tx1"/>
+                      </a:solidFill>
+                      <a:prstDash val="solid"/>
+                      <a:round/>
+                      <a:headEnd type="none" w="med" len="med"/>
+                      <a:tailEnd type="none" w="med" len="med"/>
+                    </a:lnR>
+                    <a:lnT w="12700" cap="flat" cmpd="sng" algn="ctr">
+                      <a:solidFill>
+                        <a:schemeClr val="tx1"/>
+                      </a:solidFill>
+                      <a:prstDash val="solid"/>
+                      <a:round/>
+                      <a:headEnd type="none" w="med" len="med"/>
+                      <a:tailEnd type="none" w="med" len="med"/>
+                    </a:lnT>
+                    <a:lnB w="12700" cap="flat" cmpd="sng" algn="ctr">
+                      <a:solidFill>
+                        <a:schemeClr val="tx1"/>
+                      </a:solidFill>
+                      <a:prstDash val="solid"/>
+                      <a:round/>
+                      <a:headEnd type="none" w="med" len="med"/>
+                      <a:tailEnd type="none" w="med" len="med"/>
+                    </a:lnB>
+                    <a:solidFill>
+                      <a:schemeClr val="bg1"/>
+                    </a:solidFill>
+                  </a:tcPr>
+                </a:tc>
+                <a:tc>
+                  <a:txBody>
+                    <a:bodyPr/>
+                    <a:lstStyle/>
+                    <a:p>
+                      <a:pPr algn="ctr"/>
+                      <a:r>
+                        <a:rPr lang="en-US" dirty="0" smtClean="0">
+                          <a:solidFill>
+                            <a:schemeClr val="tx1"/>
+                          </a:solidFill>
+                        </a:rPr>
+                        <a:t>12</a:t>
+                      </a:r>
+                      <a:endParaRPr lang="en-US" dirty="0">
+                        <a:solidFill>
+                          <a:schemeClr val="tx1"/>
+                        </a:solidFill>
+                      </a:endParaRPr>
+                    </a:p>
+                  </a:txBody>
+                  <a:tcPr>
+                    <a:lnL w="12700" cap="flat" cmpd="sng" algn="ctr">
+                      <a:solidFill>
+                        <a:schemeClr val="tx1"/>
+                      </a:solidFill>
+                      <a:prstDash val="solid"/>
+                      <a:round/>
+                      <a:headEnd type="none" w="med" len="med"/>
+                      <a:tailEnd type="none" w="med" len="med"/>
+                    </a:lnL>
+                    <a:lnR w="12700" cap="flat" cmpd="sng" algn="ctr">
+                      <a:solidFill>
+                        <a:schemeClr val="tx1"/>
+                      </a:solidFill>
+                      <a:prstDash val="solid"/>
+                      <a:round/>
+                      <a:headEnd type="none" w="med" len="med"/>
+                      <a:tailEnd type="none" w="med" len="med"/>
+                    </a:lnR>
+                    <a:lnT w="12700" cap="flat" cmpd="sng" algn="ctr">
+                      <a:solidFill>
+                        <a:schemeClr val="tx1"/>
+                      </a:solidFill>
+                      <a:prstDash val="solid"/>
+                      <a:round/>
+                      <a:headEnd type="none" w="med" len="med"/>
+                      <a:tailEnd type="none" w="med" len="med"/>
+                    </a:lnT>
+                    <a:lnB w="12700" cap="flat" cmpd="sng" algn="ctr">
+                      <a:solidFill>
+                        <a:schemeClr val="tx1"/>
+                      </a:solidFill>
+                      <a:prstDash val="solid"/>
+                      <a:round/>
+                      <a:headEnd type="none" w="med" len="med"/>
+                      <a:tailEnd type="none" w="med" len="med"/>
+                    </a:lnB>
+                    <a:solidFill>
+                      <a:schemeClr val="bg1"/>
+                    </a:solidFill>
+                  </a:tcPr>
+                </a:tc>
+                <a:tc>
+                  <a:txBody>
+                    <a:bodyPr/>
+                    <a:lstStyle/>
+                    <a:p>
+                      <a:pPr algn="ctr"/>
+                      <a:r>
+                        <a:rPr lang="en-US" dirty="0" smtClean="0">
+                          <a:solidFill>
+                            <a:schemeClr val="tx1"/>
+                          </a:solidFill>
+                        </a:rPr>
+                        <a:t>13</a:t>
+                      </a:r>
+                      <a:endParaRPr lang="en-US" dirty="0">
+                        <a:solidFill>
+                          <a:schemeClr val="tx1"/>
+                        </a:solidFill>
+                      </a:endParaRPr>
+                    </a:p>
+                  </a:txBody>
+                  <a:tcPr>
+                    <a:lnL w="12700" cap="flat" cmpd="sng" algn="ctr">
+                      <a:solidFill>
+                        <a:schemeClr val="tx1"/>
+                      </a:solidFill>
+                      <a:prstDash val="solid"/>
+                      <a:round/>
+                      <a:headEnd type="none" w="med" len="med"/>
+                      <a:tailEnd type="none" w="med" len="med"/>
+                    </a:lnL>
+                    <a:lnR w="12700" cap="flat" cmpd="sng" algn="ctr">
+                      <a:solidFill>
+                        <a:schemeClr val="tx1"/>
+                      </a:solidFill>
+                      <a:prstDash val="solid"/>
+                      <a:round/>
+                      <a:headEnd type="none" w="med" len="med"/>
+                      <a:tailEnd type="none" w="med" len="med"/>
+                    </a:lnR>
+                    <a:lnT w="12700" cap="flat" cmpd="sng" algn="ctr">
+                      <a:solidFill>
+                        <a:schemeClr val="tx1"/>
+                      </a:solidFill>
+                      <a:prstDash val="solid"/>
+                      <a:round/>
+                      <a:headEnd type="none" w="med" len="med"/>
+                      <a:tailEnd type="none" w="med" len="med"/>
+                    </a:lnT>
+                    <a:lnB w="12700" cap="flat" cmpd="sng" algn="ctr">
+                      <a:solidFill>
+                        <a:schemeClr val="tx1"/>
+                      </a:solidFill>
+                      <a:prstDash val="solid"/>
+                      <a:round/>
+                      <a:headEnd type="none" w="med" len="med"/>
+                      <a:tailEnd type="none" w="med" len="med"/>
+                    </a:lnB>
+                    <a:solidFill>
+                      <a:schemeClr val="bg1"/>
+                    </a:solidFill>
+                  </a:tcPr>
+                </a:tc>
+                <a:tc>
+                  <a:txBody>
+                    <a:bodyPr/>
+                    <a:lstStyle/>
+                    <a:p>
+                      <a:pPr algn="ctr"/>
+                      <a:r>
+                        <a:rPr lang="en-US" dirty="0" smtClean="0">
+                          <a:solidFill>
+                            <a:srgbClr val="FF0000"/>
+                          </a:solidFill>
+                        </a:rPr>
+                        <a:t>14</a:t>
+                      </a:r>
+                      <a:endParaRPr lang="en-US" dirty="0">
+                        <a:solidFill>
+                          <a:srgbClr val="FF0000"/>
+                        </a:solidFill>
+                      </a:endParaRPr>
+                    </a:p>
+                  </a:txBody>
+                  <a:tcPr>
+                    <a:lnL w="12700" cap="flat" cmpd="sng" algn="ctr">
+                      <a:solidFill>
+                        <a:schemeClr val="tx1"/>
+                      </a:solidFill>
+                      <a:prstDash val="solid"/>
+                      <a:round/>
+                      <a:headEnd type="none" w="med" len="med"/>
+                      <a:tailEnd type="none" w="med" len="med"/>
+                    </a:lnL>
+                    <a:lnR w="12700" cap="flat" cmpd="sng" algn="ctr">
+                      <a:solidFill>
+                        <a:schemeClr val="tx1"/>
+                      </a:solidFill>
+                      <a:prstDash val="solid"/>
+                      <a:round/>
+                      <a:headEnd type="none" w="med" len="med"/>
+                      <a:tailEnd type="none" w="med" len="med"/>
+                    </a:lnR>
+                    <a:lnT w="12700" cap="flat" cmpd="sng" algn="ctr">
+                      <a:solidFill>
+                        <a:schemeClr val="tx1"/>
+                      </a:solidFill>
+                      <a:prstDash val="solid"/>
+                      <a:round/>
+                      <a:headEnd type="none" w="med" len="med"/>
+                      <a:tailEnd type="none" w="med" len="med"/>
+                    </a:lnT>
+                    <a:lnB w="12700" cap="flat" cmpd="sng" algn="ctr">
+                      <a:solidFill>
+                        <a:schemeClr val="tx1"/>
+                      </a:solidFill>
+                      <a:prstDash val="solid"/>
+                      <a:round/>
+                      <a:headEnd type="none" w="med" len="med"/>
+                      <a:tailEnd type="none" w="med" len="med"/>
+                    </a:lnB>
+                    <a:solidFill>
+                      <a:schemeClr val="bg1">
+                        <a:lumMod val="50000"/>
+                      </a:schemeClr>
+                    </a:solidFill>
+                  </a:tcPr>
+                </a:tc>
+                <a:tc>
+                  <a:txBody>
+                    <a:bodyPr/>
+                    <a:lstStyle/>
+                    <a:p>
+                      <a:pPr algn="ctr"/>
+                      <a:r>
+                        <a:rPr lang="en-US" dirty="0" smtClean="0">
+                          <a:solidFill>
+                            <a:srgbClr val="FF0000"/>
+                          </a:solidFill>
+                        </a:rPr>
+                        <a:t>15</a:t>
+                      </a:r>
+                      <a:endParaRPr lang="en-US" dirty="0">
+                        <a:solidFill>
+                          <a:srgbClr val="FF0000"/>
+                        </a:solidFill>
+                      </a:endParaRPr>
+                    </a:p>
+                  </a:txBody>
+                  <a:tcPr>
+                    <a:lnL w="12700" cap="flat" cmpd="sng" algn="ctr">
+                      <a:solidFill>
+                        <a:schemeClr val="tx1"/>
+                      </a:solidFill>
+                      <a:prstDash val="solid"/>
+                      <a:round/>
+                      <a:headEnd type="none" w="med" len="med"/>
+                      <a:tailEnd type="none" w="med" len="med"/>
+                    </a:lnL>
+                    <a:lnR w="12700" cap="flat" cmpd="sng" algn="ctr">
+                      <a:solidFill>
+                        <a:schemeClr val="tx1"/>
+                      </a:solidFill>
+                      <a:prstDash val="solid"/>
+                      <a:round/>
+                      <a:headEnd type="none" w="med" len="med"/>
+                      <a:tailEnd type="none" w="med" len="med"/>
+                    </a:lnR>
+                    <a:lnT w="12700" cap="flat" cmpd="sng" algn="ctr">
+                      <a:solidFill>
+                        <a:schemeClr val="tx1"/>
+                      </a:solidFill>
+                      <a:prstDash val="solid"/>
+                      <a:round/>
+                      <a:headEnd type="none" w="med" len="med"/>
+                      <a:tailEnd type="none" w="med" len="med"/>
+                    </a:lnT>
+                    <a:lnB w="12700" cap="flat" cmpd="sng" algn="ctr">
+                      <a:solidFill>
+                        <a:schemeClr val="tx1"/>
+                      </a:solidFill>
+                      <a:prstDash val="solid"/>
+                      <a:round/>
+                      <a:headEnd type="none" w="med" len="med"/>
+                      <a:tailEnd type="none" w="med" len="med"/>
+                    </a:lnB>
+                    <a:solidFill>
+                      <a:schemeClr val="bg1">
+                        <a:lumMod val="50000"/>
+                      </a:schemeClr>
+                    </a:solidFill>
+                  </a:tcPr>
+                </a:tc>
+                <a:tc>
+                  <a:txBody>
+                    <a:bodyPr/>
+                    <a:lstStyle/>
+                    <a:p>
+                      <a:pPr algn="ctr"/>
+                      <a:r>
+                        <a:rPr lang="en-US" dirty="0" smtClean="0">
+                          <a:solidFill>
+                            <a:srgbClr val="FF0000"/>
+                          </a:solidFill>
+                        </a:rPr>
+                        <a:t>16</a:t>
+                      </a:r>
+                      <a:endParaRPr lang="en-US" dirty="0">
+                        <a:solidFill>
+                          <a:srgbClr val="FF0000"/>
+                        </a:solidFill>
+                      </a:endParaRPr>
+                    </a:p>
+                  </a:txBody>
+                  <a:tcPr>
+                    <a:lnL w="12700" cap="flat" cmpd="sng" algn="ctr">
+                      <a:solidFill>
+                        <a:schemeClr val="tx1"/>
+                      </a:solidFill>
+                      <a:prstDash val="solid"/>
+                      <a:round/>
+                      <a:headEnd type="none" w="med" len="med"/>
+                      <a:tailEnd type="none" w="med" len="med"/>
+                    </a:lnL>
+                    <a:lnR w="12700" cap="flat" cmpd="sng" algn="ctr">
+                      <a:solidFill>
+                        <a:schemeClr val="tx1"/>
+                      </a:solidFill>
+                      <a:prstDash val="solid"/>
+                      <a:round/>
+                      <a:headEnd type="none" w="med" len="med"/>
+                      <a:tailEnd type="none" w="med" len="med"/>
+                    </a:lnR>
+                    <a:lnT w="12700" cap="flat" cmpd="sng" algn="ctr">
+                      <a:solidFill>
+                        <a:schemeClr val="tx1"/>
+                      </a:solidFill>
+                      <a:prstDash val="solid"/>
+                      <a:round/>
+                      <a:headEnd type="none" w="med" len="med"/>
+                      <a:tailEnd type="none" w="med" len="med"/>
+                    </a:lnT>
+                    <a:lnB w="12700" cap="flat" cmpd="sng" algn="ctr">
+                      <a:solidFill>
+                        <a:schemeClr val="tx1"/>
+                      </a:solidFill>
+                      <a:prstDash val="solid"/>
+                      <a:round/>
+                      <a:headEnd type="none" w="med" len="med"/>
+                      <a:tailEnd type="none" w="med" len="med"/>
+                    </a:lnB>
+                    <a:solidFill>
+                      <a:schemeClr val="bg1">
+                        <a:lumMod val="50000"/>
+                      </a:schemeClr>
+                    </a:solidFill>
+                  </a:tcPr>
+                </a:tc>
+                <a:tc>
+                  <a:txBody>
+                    <a:bodyPr/>
+                    <a:lstStyle/>
+                    <a:p>
+                      <a:pPr algn="ctr"/>
+                      <a:r>
+                        <a:rPr lang="en-US" dirty="0" smtClean="0">
+                          <a:solidFill>
+                            <a:srgbClr val="FF0000"/>
+                          </a:solidFill>
+                        </a:rPr>
+                        <a:t>17</a:t>
+                      </a:r>
+                      <a:endParaRPr lang="en-US" dirty="0">
+                        <a:solidFill>
+                          <a:srgbClr val="FF0000"/>
+                        </a:solidFill>
+                      </a:endParaRPr>
+                    </a:p>
+                  </a:txBody>
+                  <a:tcPr>
+                    <a:lnL w="12700" cap="flat" cmpd="sng" algn="ctr">
+                      <a:solidFill>
+                        <a:schemeClr val="tx1"/>
+                      </a:solidFill>
+                      <a:prstDash val="solid"/>
+                      <a:round/>
+                      <a:headEnd type="none" w="med" len="med"/>
+                      <a:tailEnd type="none" w="med" len="med"/>
+                    </a:lnL>
+                    <a:lnR w="12700" cap="flat" cmpd="sng" algn="ctr">
+                      <a:solidFill>
+                        <a:schemeClr val="tx1"/>
+                      </a:solidFill>
+                      <a:prstDash val="solid"/>
+                      <a:round/>
+                      <a:headEnd type="none" w="med" len="med"/>
+                      <a:tailEnd type="none" w="med" len="med"/>
+                    </a:lnR>
+                    <a:lnT w="12700" cap="flat" cmpd="sng" algn="ctr">
+                      <a:solidFill>
+                        <a:schemeClr val="tx1"/>
+                      </a:solidFill>
+                      <a:prstDash val="solid"/>
+                      <a:round/>
+                      <a:headEnd type="none" w="med" len="med"/>
+                      <a:tailEnd type="none" w="med" len="med"/>
+                    </a:lnT>
+                    <a:lnB w="12700" cap="flat" cmpd="sng" algn="ctr">
+                      <a:solidFill>
+                        <a:schemeClr val="tx1"/>
+                      </a:solidFill>
+                      <a:prstDash val="solid"/>
+                      <a:round/>
+                      <a:headEnd type="none" w="med" len="med"/>
+                      <a:tailEnd type="none" w="med" len="med"/>
+                    </a:lnB>
+                    <a:solidFill>
+                      <a:schemeClr val="bg1">
+                        <a:lumMod val="50000"/>
+                      </a:schemeClr>
+                    </a:solidFill>
+                  </a:tcPr>
+                </a:tc>
+                <a:tc>
+                  <a:txBody>
+                    <a:bodyPr/>
+                    <a:lstStyle/>
+                    <a:p>
+                      <a:pPr algn="ctr"/>
+                      <a:r>
+                        <a:rPr lang="en-US" dirty="0" smtClean="0">
+                          <a:solidFill>
+                            <a:schemeClr val="tx1"/>
+                          </a:solidFill>
+                        </a:rPr>
+                        <a:t>18</a:t>
+                      </a:r>
+                      <a:endParaRPr lang="en-US" dirty="0">
+                        <a:solidFill>
+                          <a:schemeClr val="tx1"/>
+                        </a:solidFill>
+                      </a:endParaRPr>
+                    </a:p>
+                  </a:txBody>
+                  <a:tcPr>
+                    <a:lnL w="12700" cap="flat" cmpd="sng" algn="ctr">
+                      <a:solidFill>
+                        <a:schemeClr val="tx1"/>
+                      </a:solidFill>
+                      <a:prstDash val="solid"/>
+                      <a:round/>
+                      <a:headEnd type="none" w="med" len="med"/>
+                      <a:tailEnd type="none" w="med" len="med"/>
+                    </a:lnL>
+                    <a:lnR w="12700" cap="flat" cmpd="sng" algn="ctr">
+                      <a:solidFill>
+                        <a:schemeClr val="tx1"/>
+                      </a:solidFill>
+                      <a:prstDash val="solid"/>
+                      <a:round/>
+                      <a:headEnd type="none" w="med" len="med"/>
+                      <a:tailEnd type="none" w="med" len="med"/>
+                    </a:lnR>
+                    <a:lnT w="12700" cap="flat" cmpd="sng" algn="ctr">
+                      <a:solidFill>
+                        <a:schemeClr val="tx1"/>
+                      </a:solidFill>
+                      <a:prstDash val="solid"/>
+                      <a:round/>
+                      <a:headEnd type="none" w="med" len="med"/>
+                      <a:tailEnd type="none" w="med" len="med"/>
+                    </a:lnT>
+                    <a:lnB w="12700" cap="flat" cmpd="sng" algn="ctr">
+                      <a:solidFill>
+                        <a:schemeClr val="tx1"/>
+                      </a:solidFill>
+                      <a:prstDash val="solid"/>
+                      <a:round/>
+                      <a:headEnd type="none" w="med" len="med"/>
+                      <a:tailEnd type="none" w="med" len="med"/>
+                    </a:lnB>
+                    <a:solidFill>
+                      <a:schemeClr val="bg1"/>
+                    </a:solidFill>
+                  </a:tcPr>
+                </a:tc>
+                <a:tc>
+                  <a:txBody>
+                    <a:bodyPr/>
+                    <a:lstStyle/>
+                    <a:p>
+                      <a:pPr algn="ctr"/>
+                      <a:r>
+                        <a:rPr lang="en-US" dirty="0" smtClean="0">
+                          <a:solidFill>
+                            <a:schemeClr val="tx1"/>
+                          </a:solidFill>
+                        </a:rPr>
+                        <a:t>19</a:t>
+                      </a:r>
+                      <a:endParaRPr lang="en-US" dirty="0">
+                        <a:solidFill>
+                          <a:schemeClr val="tx1"/>
+                        </a:solidFill>
+                      </a:endParaRPr>
+                    </a:p>
+                  </a:txBody>
+                  <a:tcPr>
+                    <a:lnL w="12700" cap="flat" cmpd="sng" algn="ctr">
+                      <a:solidFill>
+                        <a:schemeClr val="tx1"/>
+                      </a:solidFill>
+                      <a:prstDash val="solid"/>
+                      <a:round/>
+                      <a:headEnd type="none" w="med" len="med"/>
+                      <a:tailEnd type="none" w="med" len="med"/>
+                    </a:lnL>
+                    <a:lnR w="12700" cap="flat" cmpd="sng" algn="ctr">
+                      <a:solidFill>
+                        <a:schemeClr val="tx1"/>
+                      </a:solidFill>
+                      <a:prstDash val="solid"/>
+                      <a:round/>
+                      <a:headEnd type="none" w="med" len="med"/>
+                      <a:tailEnd type="none" w="med" len="med"/>
+                    </a:lnR>
+                    <a:lnT w="12700" cap="flat" cmpd="sng" algn="ctr">
+                      <a:solidFill>
+                        <a:schemeClr val="tx1"/>
+                      </a:solidFill>
+                      <a:prstDash val="solid"/>
+                      <a:round/>
+                      <a:headEnd type="none" w="med" len="med"/>
+                      <a:tailEnd type="none" w="med" len="med"/>
+                    </a:lnT>
+                    <a:lnB w="12700" cap="flat" cmpd="sng" algn="ctr">
+                      <a:solidFill>
+                        <a:schemeClr val="tx1"/>
+                      </a:solidFill>
+                      <a:prstDash val="solid"/>
+                      <a:round/>
+                      <a:headEnd type="none" w="med" len="med"/>
+                      <a:tailEnd type="none" w="med" len="med"/>
+                    </a:lnB>
+                    <a:solidFill>
+                      <a:schemeClr val="bg1"/>
+                    </a:solidFill>
+                  </a:tcPr>
+                </a:tc>
+                <a:tc>
+                  <a:txBody>
+                    <a:bodyPr/>
+                    <a:lstStyle/>
+                    <a:p>
+                      <a:pPr algn="ctr"/>
+                      <a:r>
+                        <a:rPr lang="en-US" dirty="0" smtClean="0">
+                          <a:solidFill>
+                            <a:schemeClr val="tx1"/>
+                          </a:solidFill>
+                        </a:rPr>
+                        <a:t>20</a:t>
+                      </a:r>
+                      <a:endParaRPr lang="en-US" dirty="0">
+                        <a:solidFill>
+                          <a:schemeClr val="tx1"/>
+                        </a:solidFill>
+                      </a:endParaRPr>
+                    </a:p>
+                  </a:txBody>
+                  <a:tcPr>
+                    <a:lnL w="12700" cap="flat" cmpd="sng" algn="ctr">
+                      <a:solidFill>
+                        <a:schemeClr val="tx1"/>
+                      </a:solidFill>
+                      <a:prstDash val="solid"/>
+                      <a:round/>
+                      <a:headEnd type="none" w="med" len="med"/>
+                      <a:tailEnd type="none" w="med" len="med"/>
+                    </a:lnL>
+                    <a:lnR w="12700" cap="flat" cmpd="sng" algn="ctr">
+                      <a:solidFill>
+                        <a:schemeClr val="tx1"/>
+                      </a:solidFill>
+                      <a:prstDash val="solid"/>
+                      <a:round/>
+                      <a:headEnd type="none" w="med" len="med"/>
+                      <a:tailEnd type="none" w="med" len="med"/>
+                    </a:lnR>
+                    <a:lnT w="12700" cap="flat" cmpd="sng" algn="ctr">
+                      <a:solidFill>
+                        <a:schemeClr val="tx1"/>
+                      </a:solidFill>
+                      <a:prstDash val="solid"/>
+                      <a:round/>
+                      <a:headEnd type="none" w="med" len="med"/>
+                      <a:tailEnd type="none" w="med" len="med"/>
+                    </a:lnT>
+                    <a:lnB w="12700" cap="flat" cmpd="sng" algn="ctr">
+                      <a:solidFill>
+                        <a:schemeClr val="tx1"/>
+                      </a:solidFill>
+                      <a:prstDash val="solid"/>
+                      <a:round/>
+                      <a:headEnd type="none" w="med" len="med"/>
+                      <a:tailEnd type="none" w="med" len="med"/>
+                    </a:lnB>
+                    <a:solidFill>
+                      <a:schemeClr val="bg1"/>
+                    </a:solidFill>
+                  </a:tcPr>
+                </a:tc>
+                <a:tc>
+                  <a:txBody>
+                    <a:bodyPr/>
+                    <a:lstStyle/>
+                    <a:p>
+                      <a:pPr algn="ctr"/>
+                      <a:r>
+                        <a:rPr lang="en-US" dirty="0" smtClean="0">
+                          <a:solidFill>
+                            <a:schemeClr val="tx1"/>
+                          </a:solidFill>
+                        </a:rPr>
+                        <a:t>21</a:t>
+                      </a:r>
+                      <a:endParaRPr lang="en-US" dirty="0">
+                        <a:solidFill>
+                          <a:schemeClr val="tx1"/>
+                        </a:solidFill>
+                      </a:endParaRPr>
+                    </a:p>
+                  </a:txBody>
+                  <a:tcPr>
+                    <a:lnL w="12700" cap="flat" cmpd="sng" algn="ctr">
+                      <a:solidFill>
+                        <a:schemeClr val="tx1"/>
+                      </a:solidFill>
+                      <a:prstDash val="solid"/>
+                      <a:round/>
+                      <a:headEnd type="none" w="med" len="med"/>
+                      <a:tailEnd type="none" w="med" len="med"/>
+                    </a:lnL>
+                    <a:lnR w="12700" cap="flat" cmpd="sng" algn="ctr">
+                      <a:solidFill>
+                        <a:schemeClr val="tx1"/>
+                      </a:solidFill>
+                      <a:prstDash val="solid"/>
+                      <a:round/>
+                      <a:headEnd type="none" w="med" len="med"/>
+                      <a:tailEnd type="none" w="med" len="med"/>
+                    </a:lnR>
+                    <a:lnT w="12700" cap="flat" cmpd="sng" algn="ctr">
+                      <a:solidFill>
+                        <a:schemeClr val="tx1"/>
+                      </a:solidFill>
+                      <a:prstDash val="solid"/>
+                      <a:round/>
+                      <a:headEnd type="none" w="med" len="med"/>
+                      <a:tailEnd type="none" w="med" len="med"/>
+                    </a:lnT>
+                    <a:lnB w="12700" cap="flat" cmpd="sng" algn="ctr">
+                      <a:solidFill>
+                        <a:schemeClr val="tx1"/>
+                      </a:solidFill>
+                      <a:prstDash val="solid"/>
+                      <a:round/>
+                      <a:headEnd type="none" w="med" len="med"/>
+                      <a:tailEnd type="none" w="med" len="med"/>
+                    </a:lnB>
+                    <a:solidFill>
+                      <a:schemeClr val="bg1"/>
+                    </a:solidFill>
+                  </a:tcPr>
+                </a:tc>
+                <a:tc>
+                  <a:txBody>
+                    <a:bodyPr/>
+                    <a:lstStyle/>
+                    <a:p>
+                      <a:pPr algn="ctr"/>
+                      <a:r>
+                        <a:rPr lang="en-US" dirty="0" smtClean="0">
+                          <a:solidFill>
+                            <a:schemeClr val="tx1"/>
+                          </a:solidFill>
+                        </a:rPr>
+                        <a:t>22</a:t>
+                      </a:r>
+                      <a:endParaRPr lang="en-US" dirty="0">
+                        <a:solidFill>
+                          <a:schemeClr val="tx1"/>
+                        </a:solidFill>
+                      </a:endParaRPr>
+                    </a:p>
+                  </a:txBody>
+                  <a:tcPr>
+                    <a:lnL w="12700" cap="flat" cmpd="sng" algn="ctr">
+                      <a:solidFill>
+                        <a:schemeClr val="tx1"/>
+                      </a:solidFill>
+                      <a:prstDash val="solid"/>
+                      <a:round/>
+                      <a:headEnd type="none" w="med" len="med"/>
+                      <a:tailEnd type="none" w="med" len="med"/>
+                    </a:lnL>
+                    <a:lnR w="12700" cap="flat" cmpd="sng" algn="ctr">
+                      <a:noFill/>
+                      <a:prstDash val="solid"/>
+                      <a:round/>
+                      <a:headEnd type="none" w="med" len="med"/>
+                      <a:tailEnd type="none" w="med" len="med"/>
+                    </a:lnR>
+                    <a:lnT w="12700" cap="flat" cmpd="sng" algn="ctr">
+                      <a:solidFill>
+                        <a:schemeClr val="tx1"/>
+                      </a:solidFill>
+                      <a:prstDash val="solid"/>
+                      <a:round/>
+                      <a:headEnd type="none" w="med" len="med"/>
+                      <a:tailEnd type="none" w="med" len="med"/>
+                    </a:lnT>
+                    <a:lnB w="12700" cap="flat" cmpd="sng" algn="ctr">
+                      <a:solidFill>
+                        <a:schemeClr val="tx1"/>
+                      </a:solidFill>
+                      <a:prstDash val="solid"/>
+                      <a:round/>
+                      <a:headEnd type="none" w="med" len="med"/>
+                      <a:tailEnd type="none" w="med" len="med"/>
+                    </a:lnB>
+                    <a:solidFill>
+                      <a:schemeClr val="bg1"/>
+                    </a:solidFill>
+                  </a:tcPr>
+                </a:tc>
+              </a:tr>
+            </a:tbl>
+          </a:graphicData>
+        </a:graphic>
+      </p:graphicFrame>
+    </p:spTree>
+    <p:extLst>
+      <p:ext uri="{BB962C8B-B14F-4D97-AF65-F5344CB8AC3E}">
+        <p14:creationId xmlns:p14="http://schemas.microsoft.com/office/powerpoint/2010/main" val="2049199657"/>
+      </p:ext>
+    </p:extLst>
+  </p:cSld>
+  <p:clrMapOvr>
+    <a:masterClrMapping/>
+  </p:clrMapOvr>
+  <p:timing>
+    <p:tnLst>
+      <p:par>
+        <p:cTn id="1" dur="indefinite" restart="never" nodeType="tmRoot">
+          <p:childTnLst>
+            <p:seq concurrent="1" nextAc="seek">
+              <p:cTn id="2" dur="indefinite" nodeType="mainSeq">
+                <p:childTnLst>
+                  <p:par>
+                    <p:cTn id="3" fill="hold">
+                      <p:stCondLst>
+                        <p:cond delay="indefinite"/>
+                      </p:stCondLst>
+                      <p:childTnLst>
+                        <p:par>
+                          <p:cTn id="4" fill="hold">
+                            <p:stCondLst>
+                              <p:cond delay="0"/>
+                            </p:stCondLst>
+                            <p:childTnLst>
+                              <p:par>
+                                <p:cTn id="5" presetID="1" presetClass="entr" presetSubtype="0" fill="hold" grpId="0" nodeType="clickEffect">
+                                  <p:stCondLst>
+                                    <p:cond delay="0"/>
+                                  </p:stCondLst>
+                                  <p:childTnLst>
+                                    <p:set>
+                                      <p:cBhvr>
+                                        <p:cTn id="6" dur="1" fill="hold">
+                                          <p:stCondLst>
+                                            <p:cond delay="0"/>
+                                          </p:stCondLst>
+                                        </p:cTn>
+                                        <p:tgtEl>
+                                          <p:spTgt spid="3">
+                                            <p:txEl>
+                                              <p:pRg st="1" end="1"/>
+                                            </p:txEl>
+                                          </p:spTgt>
+                                        </p:tgtEl>
+                                        <p:attrNameLst>
+                                          <p:attrName>style.visibility</p:attrName>
+                                        </p:attrNameLst>
+                                      </p:cBhvr>
+                                      <p:to>
+                                        <p:strVal val="visible"/>
+                                      </p:to>
+                                    </p:set>
+                                  </p:childTnLst>
+                                </p:cTn>
+                              </p:par>
+                            </p:childTnLst>
+                          </p:cTn>
+                        </p:par>
+                      </p:childTnLst>
+                    </p:cTn>
+                  </p:par>
+                  <p:par>
+                    <p:cTn id="7" fill="hold">
+                      <p:stCondLst>
+                        <p:cond delay="indefinite"/>
+                      </p:stCondLst>
+                      <p:childTnLst>
+                        <p:par>
+                          <p:cTn id="8" fill="hold">
+                            <p:stCondLst>
+                              <p:cond delay="0"/>
+                            </p:stCondLst>
+                            <p:childTnLst>
+                              <p:par>
+                                <p:cTn id="9" presetID="1" presetClass="entr" presetSubtype="0" fill="hold" grpId="0" nodeType="clickEffect">
+                                  <p:stCondLst>
+                                    <p:cond delay="0"/>
+                                  </p:stCondLst>
+                                  <p:childTnLst>
+                                    <p:set>
+                                      <p:cBhvr>
+                                        <p:cTn id="10" dur="1" fill="hold">
+                                          <p:stCondLst>
+                                            <p:cond delay="0"/>
+                                          </p:stCondLst>
+                                        </p:cTn>
+                                        <p:tgtEl>
+                                          <p:spTgt spid="3">
+                                            <p:txEl>
+                                              <p:pRg st="2" end="2"/>
+                                            </p:txEl>
+                                          </p:spTgt>
+                                        </p:tgtEl>
+                                        <p:attrNameLst>
+                                          <p:attrName>style.visibility</p:attrName>
+                                        </p:attrNameLst>
+                                      </p:cBhvr>
+                                      <p:to>
+                                        <p:strVal val="visible"/>
+                                      </p:to>
+                                    </p:set>
+                                  </p:childTnLst>
+                                </p:cTn>
+                              </p:par>
+                            </p:childTnLst>
+                          </p:cTn>
+                        </p:par>
+                      </p:childTnLst>
+                    </p:cTn>
+                  </p:par>
+                  <p:par>
+                    <p:cTn id="11" fill="hold">
+                      <p:stCondLst>
+                        <p:cond delay="indefinite"/>
+                      </p:stCondLst>
+                      <p:childTnLst>
+                        <p:par>
+                          <p:cTn id="12" fill="hold">
+                            <p:stCondLst>
+                              <p:cond delay="0"/>
+                            </p:stCondLst>
+                            <p:childTnLst>
+                              <p:par>
+                                <p:cTn id="13" presetID="1" presetClass="entr" presetSubtype="0" fill="hold" grpId="0" nodeType="clickEffect">
+                                  <p:stCondLst>
+                                    <p:cond delay="0"/>
+                                  </p:stCondLst>
+                                  <p:childTnLst>
+                                    <p:set>
+                                      <p:cBhvr>
+                                        <p:cTn id="14" dur="1" fill="hold">
+                                          <p:stCondLst>
+                                            <p:cond delay="0"/>
+                                          </p:stCondLst>
+                                        </p:cTn>
+                                        <p:tgtEl>
+                                          <p:spTgt spid="3">
+                                            <p:txEl>
+                                              <p:pRg st="3" end="3"/>
+                                            </p:txEl>
+                                          </p:spTgt>
+                                        </p:tgtEl>
+                                        <p:attrNameLst>
+                                          <p:attrName>style.visibility</p:attrName>
+                                        </p:attrNameLst>
+                                      </p:cBhvr>
+                                      <p:to>
+                                        <p:strVal val="visible"/>
+                                      </p:to>
+                                    </p:set>
+                                  </p:childTnLst>
+                                </p:cTn>
+                              </p:par>
+                            </p:childTnLst>
+                          </p:cTn>
+                        </p:par>
+                      </p:childTnLst>
+                    </p:cTn>
+                  </p:par>
+                  <p:par>
+                    <p:cTn id="15" fill="hold">
+                      <p:stCondLst>
+                        <p:cond delay="indefinite"/>
+                      </p:stCondLst>
+                      <p:childTnLst>
+                        <p:par>
+                          <p:cTn id="16" fill="hold">
+                            <p:stCondLst>
+                              <p:cond delay="0"/>
+                            </p:stCondLst>
+                            <p:childTnLst>
+                              <p:par>
+                                <p:cTn id="17" presetID="1" presetClass="entr" presetSubtype="0" fill="hold" grpId="0" nodeType="clickEffect">
+                                  <p:stCondLst>
+                                    <p:cond delay="0"/>
+                                  </p:stCondLst>
+                                  <p:childTnLst>
+                                    <p:set>
+                                      <p:cBhvr>
+                                        <p:cTn id="18" dur="1" fill="hold">
+                                          <p:stCondLst>
+                                            <p:cond delay="0"/>
+                                          </p:stCondLst>
+                                        </p:cTn>
+                                        <p:tgtEl>
+                                          <p:spTgt spid="3">
+                                            <p:txEl>
+                                              <p:pRg st="5" end="5"/>
+                                            </p:txEl>
+                                          </p:spTgt>
+                                        </p:tgtEl>
+                                        <p:attrNameLst>
+                                          <p:attrName>style.visibility</p:attrName>
+                                        </p:attrNameLst>
+                                      </p:cBhvr>
+                                      <p:to>
+                                        <p:strVal val="visible"/>
+                                      </p:to>
+                                    </p:set>
+                                  </p:childTnLst>
+                                </p:cTn>
+                              </p:par>
+                            </p:childTnLst>
+                          </p:cTn>
+                        </p:par>
+                      </p:childTnLst>
+                    </p:cTn>
+                  </p:par>
+                  <p:par>
+                    <p:cTn id="19" fill="hold">
+                      <p:stCondLst>
+                        <p:cond delay="indefinite"/>
+                      </p:stCondLst>
+                      <p:childTnLst>
+                        <p:par>
+                          <p:cTn id="20" fill="hold">
+                            <p:stCondLst>
+                              <p:cond delay="0"/>
+                            </p:stCondLst>
+                            <p:childTnLst>
+                              <p:par>
+                                <p:cTn id="21" presetID="1" presetClass="entr" presetSubtype="0" fill="hold" grpId="0" nodeType="clickEffect">
+                                  <p:stCondLst>
+                                    <p:cond delay="0"/>
+                                  </p:stCondLst>
+                                  <p:childTnLst>
+                                    <p:set>
+                                      <p:cBhvr>
+                                        <p:cTn id="22" dur="1" fill="hold">
+                                          <p:stCondLst>
+                                            <p:cond delay="0"/>
+                                          </p:stCondLst>
+                                        </p:cTn>
+                                        <p:tgtEl>
+                                          <p:spTgt spid="3">
+                                            <p:txEl>
+                                              <p:pRg st="6" end="6"/>
+                                            </p:txEl>
+                                          </p:spTgt>
+                                        </p:tgtEl>
+                                        <p:attrNameLst>
+                                          <p:attrName>style.visibility</p:attrName>
+                                        </p:attrNameLst>
+                                      </p:cBhvr>
+                                      <p:to>
+                                        <p:strVal val="visible"/>
+                                      </p:to>
+                                    </p:set>
+                                  </p:childTnLst>
+                                </p:cTn>
+                              </p:par>
+                            </p:childTnLst>
+                          </p:cTn>
+                        </p:par>
+                      </p:childTnLst>
+                    </p:cTn>
+                  </p:par>
+                </p:childTnLst>
+              </p:cTn>
+              <p:prevCondLst>
+                <p:cond evt="onPrev" delay="0">
+                  <p:tgtEl>
+                    <p:sldTgt/>
+                  </p:tgtEl>
+                </p:cond>
+              </p:prevCondLst>
+              <p:nextCondLst>
+                <p:cond evt="onNext" delay="0">
+                  <p:tgtEl>
+                    <p:sldTgt/>
+                  </p:tgtEl>
+                </p:cond>
+              </p:nextCondLst>
+            </p:seq>
+          </p:childTnLst>
+        </p:cTn>
+      </p:par>
+    </p:tnLst>
+    <p:bldLst>
+      <p:bldP spid="3" grpId="0" build="p"/>
+    </p:bldLst>
+  </p:timing>
+</p:sld>
+</file>
+
+<file path=ppt/slides/slide9.xml><?xml version="1.0" encoding="utf-8"?>
+<p:sld xmlns:a="http://schemas.openxmlformats.org/drawingml/2006/main" xmlns:r="http://schemas.openxmlformats.org/officeDocument/2006/relationships" xmlns:p="http://schemas.openxmlformats.org/presentationml/2006/main">
+  <p:cSld>
+    <p:spTree>
+      <p:nvGrpSpPr>
+        <p:cNvPr id="1" name=""/>
+        <p:cNvGrpSpPr/>
+        <p:nvPr/>
+      </p:nvGrpSpPr>
+      <p:grpSpPr>
+        <a:xfrm>
+          <a:off x="0" y="0"/>
+          <a:ext cx="0" cy="0"/>
+          <a:chOff x="0" y="0"/>
+          <a:chExt cx="0" cy="0"/>
+        </a:xfrm>
+      </p:grpSpPr>
+      <p:sp>
+        <p:nvSpPr>
+          <p:cNvPr id="3" name="Content Placeholder 2"/>
+          <p:cNvSpPr>
+            <a:spLocks noGrp="1"/>
+          </p:cNvSpPr>
+          <p:nvPr>
+            <p:ph idx="1"/>
+          </p:nvPr>
+        </p:nvSpPr>
+        <p:spPr>
+          <a:xfrm>
+            <a:off x="228600" y="1828800"/>
             <a:ext cx="8534400" cy="4191000"/>
           </a:xfrm>
         </p:spPr>
@@ -16035,8 +19203,44 @@
             <a:pPr lvl="1"/>
             <a:r>
               <a:rPr lang="en-US" dirty="0" smtClean="0"/>
-              <a:t>Good growth.</a:t>
+              <a:t>Good growth</a:t>
             </a:r>
+            <a:r>
+              <a:rPr lang="en-US" dirty="0" smtClean="0"/>
+              <a:t>.</a:t>
+            </a:r>
+          </a:p>
+          <a:p>
+            <a:endParaRPr lang="en-US" dirty="0"/>
+          </a:p>
+          <a:p>
+            <a:r>
+              <a:rPr lang="en-US" dirty="0" smtClean="0">
+                <a:hlinkClick r:id="rId2"/>
+              </a:rPr>
+              <a:t>Check </a:t>
+            </a:r>
+            <a:r>
+              <a:rPr lang="en-US" dirty="0">
+                <a:hlinkClick r:id="rId2"/>
+              </a:rPr>
+              <a:t>this out!</a:t>
+            </a:r>
+            <a:r>
+              <a:rPr lang="en-US" sz="1600" dirty="0">
+                <a:hlinkClick r:id="rId2"/>
+              </a:rPr>
+              <a:t> </a:t>
+            </a:r>
+            <a:r>
+              <a:rPr lang="en-US" sz="1600" dirty="0"/>
+              <a:t>(</a:t>
+            </a:r>
+            <a:r>
+              <a:rPr lang="en-US" sz="1600" dirty="0" smtClean="0"/>
+              <a:t>0:35-3:37)</a:t>
+            </a:r>
+            <a:endParaRPr lang="en-US" dirty="0" smtClean="0"/>
           </a:p>
           <a:p>
             <a:pPr lvl="1"/>
@@ -16092,7 +19296,7 @@
             <a:fld id="{1885BB51-0796-4632-BDB9-6CE403630838}" type="slidenum">
               <a:rPr lang="en-US" smtClean="0"/>
               <a:pPr/>
-              <a:t>8</a:t>
+              <a:t>9</a:t>
             </a:fld>
             <a:endParaRPr lang="en-US"/>
           </a:p>
@@ -17466,1367 +20670,27 @@
                       </p:childTnLst>
                     </p:cTn>
                   </p:par>
-                </p:childTnLst>
-              </p:cTn>
-              <p:prevCondLst>
-                <p:cond evt="onPrev" delay="0">
-                  <p:tgtEl>
-                    <p:sldTgt/>
-                  </p:tgtEl>
-                </p:cond>
-              </p:prevCondLst>
-              <p:nextCondLst>
-                <p:cond evt="onNext" delay="0">
-                  <p:tgtEl>
-                    <p:sldTgt/>
-                  </p:tgtEl>
-                </p:cond>
-              </p:nextCondLst>
-            </p:seq>
-          </p:childTnLst>
-        </p:cTn>
-      </p:par>
-    </p:tnLst>
-    <p:bldLst>
-      <p:bldP spid="3" grpId="0" uiExpand="1" build="p"/>
-    </p:bldLst>
-  </p:timing>
-</p:sld>
-</file>
-
-<file path=ppt/slides/slide9.xml><?xml version="1.0" encoding="utf-8"?>
-<p:sld xmlns:a="http://schemas.openxmlformats.org/drawingml/2006/main" xmlns:r="http://schemas.openxmlformats.org/officeDocument/2006/relationships" xmlns:p="http://schemas.openxmlformats.org/presentationml/2006/main">
-  <p:cSld>
-    <p:spTree>
-      <p:nvGrpSpPr>
-        <p:cNvPr id="1" name=""/>
-        <p:cNvGrpSpPr/>
-        <p:nvPr/>
-      </p:nvGrpSpPr>
-      <p:grpSpPr>
-        <a:xfrm>
-          <a:off x="0" y="0"/>
-          <a:ext cx="0" cy="0"/>
-          <a:chOff x="0" y="0"/>
-          <a:chExt cx="0" cy="0"/>
-        </a:xfrm>
-      </p:grpSpPr>
-      <p:sp>
-        <p:nvSpPr>
-          <p:cNvPr id="3" name="Content Placeholder 2"/>
-          <p:cNvSpPr>
-            <a:spLocks noGrp="1"/>
-          </p:cNvSpPr>
-          <p:nvPr>
-            <p:ph idx="1"/>
-          </p:nvPr>
-        </p:nvSpPr>
-        <p:spPr>
-          <a:xfrm>
-            <a:off x="228600" y="1828800"/>
-            <a:ext cx="8686800" cy="3124200"/>
-          </a:xfrm>
-        </p:spPr>
-        <p:txBody>
-          <a:bodyPr/>
-          <a:lstStyle/>
-          <a:p>
-            <a:r>
-              <a:rPr lang="en-US" dirty="0" smtClean="0"/>
-              <a:t>Possible reasons to use.</a:t>
-            </a:r>
-          </a:p>
-          <a:p>
-            <a:pPr lvl="1"/>
-            <a:r>
-              <a:rPr lang="en-US" dirty="0" smtClean="0"/>
-              <a:t>Protect relatively few sexually mature adults.</a:t>
-            </a:r>
-          </a:p>
-          <a:p>
-            <a:pPr lvl="1"/>
-            <a:r>
-              <a:rPr lang="en-US" dirty="0" smtClean="0"/>
-              <a:t>Protect important large </a:t>
-            </a:r>
-            <a:r>
-              <a:rPr lang="en-US" dirty="0" err="1" smtClean="0"/>
-              <a:t>spawners</a:t>
-            </a:r>
-            <a:r>
-              <a:rPr lang="en-US" dirty="0" smtClean="0"/>
-              <a:t>.</a:t>
-            </a:r>
-          </a:p>
-          <a:p>
-            <a:pPr lvl="1"/>
-            <a:r>
-              <a:rPr lang="en-US" dirty="0" smtClean="0"/>
-              <a:t>Reduce numbers of small fish (and potentially increase growth rates).</a:t>
-            </a:r>
-          </a:p>
-        </p:txBody>
-      </p:sp>
-      <p:sp>
-        <p:nvSpPr>
-          <p:cNvPr id="4" name="Footer Placeholder 3"/>
-          <p:cNvSpPr>
-            <a:spLocks noGrp="1"/>
-          </p:cNvSpPr>
-          <p:nvPr>
-            <p:ph type="ftr" sz="quarter" idx="10"/>
-          </p:nvPr>
-        </p:nvSpPr>
-        <p:spPr/>
-        <p:txBody>
-          <a:bodyPr/>
-          <a:lstStyle/>
-          <a:p>
-            <a:r>
-              <a:rPr lang="en-US" smtClean="0"/>
-              <a:t>Management Regulations</a:t>
-            </a:r>
-            <a:endParaRPr lang="en-US"/>
-          </a:p>
-        </p:txBody>
-      </p:sp>
-      <p:sp>
-        <p:nvSpPr>
-          <p:cNvPr id="5" name="Slide Number Placeholder 4"/>
-          <p:cNvSpPr>
-            <a:spLocks noGrp="1"/>
-          </p:cNvSpPr>
-          <p:nvPr>
-            <p:ph type="sldNum" sz="quarter" idx="11"/>
-          </p:nvPr>
-        </p:nvSpPr>
-        <p:spPr/>
-        <p:txBody>
-          <a:bodyPr/>
-          <a:lstStyle/>
-          <a:p>
-            <a:fld id="{1885BB51-0796-4632-BDB9-6CE403630838}" type="slidenum">
-              <a:rPr lang="en-US" smtClean="0"/>
-              <a:pPr/>
-              <a:t>9</a:t>
-            </a:fld>
-            <a:endParaRPr lang="en-US"/>
-          </a:p>
-        </p:txBody>
-      </p:sp>
-      <p:graphicFrame>
-        <p:nvGraphicFramePr>
-          <p:cNvPr id="6" name="Content Placeholder 5"/>
-          <p:cNvGraphicFramePr>
-            <a:graphicFrameLocks/>
-          </p:cNvGraphicFramePr>
-          <p:nvPr>
-            <p:extLst>
-              <p:ext uri="{D42A27DB-BD31-4B8C-83A1-F6EECF244321}">
-                <p14:modId xmlns:p14="http://schemas.microsoft.com/office/powerpoint/2010/main" val="2532670350"/>
-              </p:ext>
-            </p:extLst>
-          </p:nvPr>
-        </p:nvGraphicFramePr>
-        <p:xfrm>
-          <a:off x="381000" y="990600"/>
-          <a:ext cx="8229581" cy="370840"/>
-        </p:xfrm>
-        <a:graphic>
-          <a:graphicData uri="http://schemas.openxmlformats.org/drawingml/2006/table">
-            <a:tbl>
-              <a:tblPr firstRow="1" bandRow="1">
-                <a:tableStyleId>{5C22544A-7EE6-4342-B048-85BDC9FD1C3A}</a:tableStyleId>
-              </a:tblPr>
-              <a:tblGrid>
-                <a:gridCol w="484093"/>
-                <a:gridCol w="484093"/>
-                <a:gridCol w="484093"/>
-                <a:gridCol w="484093"/>
-                <a:gridCol w="484093"/>
-                <a:gridCol w="484093"/>
-                <a:gridCol w="484093"/>
-                <a:gridCol w="484093"/>
-                <a:gridCol w="484093"/>
-                <a:gridCol w="484093"/>
-                <a:gridCol w="484093"/>
-                <a:gridCol w="484093"/>
-                <a:gridCol w="484093"/>
-                <a:gridCol w="484093"/>
-                <a:gridCol w="484093"/>
-                <a:gridCol w="484093"/>
-                <a:gridCol w="484093"/>
-              </a:tblGrid>
-              <a:tr h="370840">
-                <a:tc>
-                  <a:txBody>
-                    <a:bodyPr/>
-                    <a:lstStyle/>
-                    <a:p>
-                      <a:pPr algn="ctr"/>
-                      <a:r>
-                        <a:rPr lang="en-US" dirty="0" smtClean="0">
-                          <a:solidFill>
-                            <a:schemeClr val="tx1"/>
-                          </a:solidFill>
-                        </a:rPr>
-                        <a:t>6</a:t>
-                      </a:r>
-                      <a:endParaRPr lang="en-US" dirty="0">
-                        <a:solidFill>
-                          <a:schemeClr val="tx1"/>
-                        </a:solidFill>
-                      </a:endParaRPr>
-                    </a:p>
-                  </a:txBody>
-                  <a:tcPr>
-                    <a:lnL w="12700" cap="flat" cmpd="sng" algn="ctr">
-                      <a:noFill/>
-                      <a:prstDash val="solid"/>
-                      <a:round/>
-                      <a:headEnd type="none" w="med" len="med"/>
-                      <a:tailEnd type="none" w="med" len="med"/>
-                    </a:lnL>
-                    <a:lnR w="12700" cap="flat" cmpd="sng" algn="ctr">
-                      <a:solidFill>
-                        <a:schemeClr val="tx1"/>
-                      </a:solidFill>
-                      <a:prstDash val="solid"/>
-                      <a:round/>
-                      <a:headEnd type="none" w="med" len="med"/>
-                      <a:tailEnd type="none" w="med" len="med"/>
-                    </a:lnR>
-                    <a:lnT w="12700" cap="flat" cmpd="sng" algn="ctr">
-                      <a:solidFill>
-                        <a:schemeClr val="tx1"/>
-                      </a:solidFill>
-                      <a:prstDash val="solid"/>
-                      <a:round/>
-                      <a:headEnd type="none" w="med" len="med"/>
-                      <a:tailEnd type="none" w="med" len="med"/>
-                    </a:lnT>
-                    <a:lnB w="12700" cap="flat" cmpd="sng" algn="ctr">
-                      <a:solidFill>
-                        <a:schemeClr val="tx1"/>
-                      </a:solidFill>
-                      <a:prstDash val="solid"/>
-                      <a:round/>
-                      <a:headEnd type="none" w="med" len="med"/>
-                      <a:tailEnd type="none" w="med" len="med"/>
-                    </a:lnB>
-                    <a:solidFill>
-                      <a:schemeClr val="bg1"/>
-                    </a:solidFill>
-                  </a:tcPr>
-                </a:tc>
-                <a:tc>
-                  <a:txBody>
-                    <a:bodyPr/>
-                    <a:lstStyle/>
-                    <a:p>
-                      <a:pPr algn="ctr"/>
-                      <a:r>
-                        <a:rPr lang="en-US" dirty="0" smtClean="0">
-                          <a:solidFill>
-                            <a:schemeClr val="tx1"/>
-                          </a:solidFill>
-                        </a:rPr>
-                        <a:t>7</a:t>
-                      </a:r>
-                      <a:endParaRPr lang="en-US" dirty="0">
-                        <a:solidFill>
-                          <a:schemeClr val="tx1"/>
-                        </a:solidFill>
-                      </a:endParaRPr>
-                    </a:p>
-                  </a:txBody>
-                  <a:tcPr>
-                    <a:lnL w="12700" cap="flat" cmpd="sng" algn="ctr">
-                      <a:solidFill>
-                        <a:schemeClr val="tx1"/>
-                      </a:solidFill>
-                      <a:prstDash val="solid"/>
-                      <a:round/>
-                      <a:headEnd type="none" w="med" len="med"/>
-                      <a:tailEnd type="none" w="med" len="med"/>
-                    </a:lnL>
-                    <a:lnR w="12700" cap="flat" cmpd="sng" algn="ctr">
-                      <a:solidFill>
-                        <a:schemeClr val="tx1"/>
-                      </a:solidFill>
-                      <a:prstDash val="solid"/>
-                      <a:round/>
-                      <a:headEnd type="none" w="med" len="med"/>
-                      <a:tailEnd type="none" w="med" len="med"/>
-                    </a:lnR>
-                    <a:lnT w="12700" cap="flat" cmpd="sng" algn="ctr">
-                      <a:solidFill>
-                        <a:schemeClr val="tx1"/>
-                      </a:solidFill>
-                      <a:prstDash val="solid"/>
-                      <a:round/>
-                      <a:headEnd type="none" w="med" len="med"/>
-                      <a:tailEnd type="none" w="med" len="med"/>
-                    </a:lnT>
-                    <a:lnB w="12700" cap="flat" cmpd="sng" algn="ctr">
-                      <a:solidFill>
-                        <a:schemeClr val="tx1"/>
-                      </a:solidFill>
-                      <a:prstDash val="solid"/>
-                      <a:round/>
-                      <a:headEnd type="none" w="med" len="med"/>
-                      <a:tailEnd type="none" w="med" len="med"/>
-                    </a:lnB>
-                    <a:solidFill>
-                      <a:schemeClr val="bg1"/>
-                    </a:solidFill>
-                  </a:tcPr>
-                </a:tc>
-                <a:tc>
-                  <a:txBody>
-                    <a:bodyPr/>
-                    <a:lstStyle/>
-                    <a:p>
-                      <a:pPr algn="ctr"/>
-                      <a:r>
-                        <a:rPr lang="en-US" dirty="0" smtClean="0">
-                          <a:solidFill>
-                            <a:schemeClr val="tx1"/>
-                          </a:solidFill>
-                        </a:rPr>
-                        <a:t>8</a:t>
-                      </a:r>
-                      <a:endParaRPr lang="en-US" dirty="0">
-                        <a:solidFill>
-                          <a:schemeClr val="tx1"/>
-                        </a:solidFill>
-                      </a:endParaRPr>
-                    </a:p>
-                  </a:txBody>
-                  <a:tcPr>
-                    <a:lnL w="12700" cap="flat" cmpd="sng" algn="ctr">
-                      <a:solidFill>
-                        <a:schemeClr val="tx1"/>
-                      </a:solidFill>
-                      <a:prstDash val="solid"/>
-                      <a:round/>
-                      <a:headEnd type="none" w="med" len="med"/>
-                      <a:tailEnd type="none" w="med" len="med"/>
-                    </a:lnL>
-                    <a:lnR w="12700" cap="flat" cmpd="sng" algn="ctr">
-                      <a:solidFill>
-                        <a:schemeClr val="tx1"/>
-                      </a:solidFill>
-                      <a:prstDash val="solid"/>
-                      <a:round/>
-                      <a:headEnd type="none" w="med" len="med"/>
-                      <a:tailEnd type="none" w="med" len="med"/>
-                    </a:lnR>
-                    <a:lnT w="12700" cap="flat" cmpd="sng" algn="ctr">
-                      <a:solidFill>
-                        <a:schemeClr val="tx1"/>
-                      </a:solidFill>
-                      <a:prstDash val="solid"/>
-                      <a:round/>
-                      <a:headEnd type="none" w="med" len="med"/>
-                      <a:tailEnd type="none" w="med" len="med"/>
-                    </a:lnT>
-                    <a:lnB w="12700" cap="flat" cmpd="sng" algn="ctr">
-                      <a:solidFill>
-                        <a:schemeClr val="tx1"/>
-                      </a:solidFill>
-                      <a:prstDash val="solid"/>
-                      <a:round/>
-                      <a:headEnd type="none" w="med" len="med"/>
-                      <a:tailEnd type="none" w="med" len="med"/>
-                    </a:lnB>
-                    <a:solidFill>
-                      <a:schemeClr val="bg1"/>
-                    </a:solidFill>
-                  </a:tcPr>
-                </a:tc>
-                <a:tc>
-                  <a:txBody>
-                    <a:bodyPr/>
-                    <a:lstStyle/>
-                    <a:p>
-                      <a:pPr algn="ctr"/>
-                      <a:r>
-                        <a:rPr lang="en-US" dirty="0" smtClean="0">
-                          <a:solidFill>
-                            <a:schemeClr val="tx1"/>
-                          </a:solidFill>
-                        </a:rPr>
-                        <a:t>9</a:t>
-                      </a:r>
-                      <a:endParaRPr lang="en-US" dirty="0">
-                        <a:solidFill>
-                          <a:schemeClr val="tx1"/>
-                        </a:solidFill>
-                      </a:endParaRPr>
-                    </a:p>
-                  </a:txBody>
-                  <a:tcPr>
-                    <a:lnL w="12700" cap="flat" cmpd="sng" algn="ctr">
-                      <a:solidFill>
-                        <a:schemeClr val="tx1"/>
-                      </a:solidFill>
-                      <a:prstDash val="solid"/>
-                      <a:round/>
-                      <a:headEnd type="none" w="med" len="med"/>
-                      <a:tailEnd type="none" w="med" len="med"/>
-                    </a:lnL>
-                    <a:lnR w="12700" cap="flat" cmpd="sng" algn="ctr">
-                      <a:solidFill>
-                        <a:schemeClr val="tx1"/>
-                      </a:solidFill>
-                      <a:prstDash val="solid"/>
-                      <a:round/>
-                      <a:headEnd type="none" w="med" len="med"/>
-                      <a:tailEnd type="none" w="med" len="med"/>
-                    </a:lnR>
-                    <a:lnT w="12700" cap="flat" cmpd="sng" algn="ctr">
-                      <a:solidFill>
-                        <a:schemeClr val="tx1"/>
-                      </a:solidFill>
-                      <a:prstDash val="solid"/>
-                      <a:round/>
-                      <a:headEnd type="none" w="med" len="med"/>
-                      <a:tailEnd type="none" w="med" len="med"/>
-                    </a:lnT>
-                    <a:lnB w="12700" cap="flat" cmpd="sng" algn="ctr">
-                      <a:solidFill>
-                        <a:schemeClr val="tx1"/>
-                      </a:solidFill>
-                      <a:prstDash val="solid"/>
-                      <a:round/>
-                      <a:headEnd type="none" w="med" len="med"/>
-                      <a:tailEnd type="none" w="med" len="med"/>
-                    </a:lnB>
-                    <a:solidFill>
-                      <a:schemeClr val="bg1"/>
-                    </a:solidFill>
-                  </a:tcPr>
-                </a:tc>
-                <a:tc>
-                  <a:txBody>
-                    <a:bodyPr/>
-                    <a:lstStyle/>
-                    <a:p>
-                      <a:pPr algn="ctr"/>
-                      <a:r>
-                        <a:rPr lang="en-US" dirty="0" smtClean="0">
-                          <a:solidFill>
-                            <a:schemeClr val="tx1"/>
-                          </a:solidFill>
-                        </a:rPr>
-                        <a:t>10</a:t>
-                      </a:r>
-                      <a:endParaRPr lang="en-US" dirty="0">
-                        <a:solidFill>
-                          <a:schemeClr val="tx1"/>
-                        </a:solidFill>
-                      </a:endParaRPr>
-                    </a:p>
-                  </a:txBody>
-                  <a:tcPr>
-                    <a:lnL w="12700" cap="flat" cmpd="sng" algn="ctr">
-                      <a:solidFill>
-                        <a:schemeClr val="tx1"/>
-                      </a:solidFill>
-                      <a:prstDash val="solid"/>
-                      <a:round/>
-                      <a:headEnd type="none" w="med" len="med"/>
-                      <a:tailEnd type="none" w="med" len="med"/>
-                    </a:lnL>
-                    <a:lnR w="12700" cap="flat" cmpd="sng" algn="ctr">
-                      <a:solidFill>
-                        <a:schemeClr val="tx1"/>
-                      </a:solidFill>
-                      <a:prstDash val="solid"/>
-                      <a:round/>
-                      <a:headEnd type="none" w="med" len="med"/>
-                      <a:tailEnd type="none" w="med" len="med"/>
-                    </a:lnR>
-                    <a:lnT w="12700" cap="flat" cmpd="sng" algn="ctr">
-                      <a:solidFill>
-                        <a:schemeClr val="tx1"/>
-                      </a:solidFill>
-                      <a:prstDash val="solid"/>
-                      <a:round/>
-                      <a:headEnd type="none" w="med" len="med"/>
-                      <a:tailEnd type="none" w="med" len="med"/>
-                    </a:lnT>
-                    <a:lnB w="12700" cap="flat" cmpd="sng" algn="ctr">
-                      <a:solidFill>
-                        <a:schemeClr val="tx1"/>
-                      </a:solidFill>
-                      <a:prstDash val="solid"/>
-                      <a:round/>
-                      <a:headEnd type="none" w="med" len="med"/>
-                      <a:tailEnd type="none" w="med" len="med"/>
-                    </a:lnB>
-                    <a:solidFill>
-                      <a:schemeClr val="bg1"/>
-                    </a:solidFill>
-                  </a:tcPr>
-                </a:tc>
-                <a:tc>
-                  <a:txBody>
-                    <a:bodyPr/>
-                    <a:lstStyle/>
-                    <a:p>
-                      <a:pPr algn="ctr"/>
-                      <a:r>
-                        <a:rPr lang="en-US" dirty="0" smtClean="0">
-                          <a:solidFill>
-                            <a:schemeClr val="tx1"/>
-                          </a:solidFill>
-                        </a:rPr>
-                        <a:t>11</a:t>
-                      </a:r>
-                      <a:endParaRPr lang="en-US" dirty="0">
-                        <a:solidFill>
-                          <a:schemeClr val="tx1"/>
-                        </a:solidFill>
-                      </a:endParaRPr>
-                    </a:p>
-                  </a:txBody>
-                  <a:tcPr>
-                    <a:lnL w="12700" cap="flat" cmpd="sng" algn="ctr">
-                      <a:solidFill>
-                        <a:schemeClr val="tx1"/>
-                      </a:solidFill>
-                      <a:prstDash val="solid"/>
-                      <a:round/>
-                      <a:headEnd type="none" w="med" len="med"/>
-                      <a:tailEnd type="none" w="med" len="med"/>
-                    </a:lnL>
-                    <a:lnR w="12700" cap="flat" cmpd="sng" algn="ctr">
-                      <a:solidFill>
-                        <a:schemeClr val="tx1"/>
-                      </a:solidFill>
-                      <a:prstDash val="solid"/>
-                      <a:round/>
-                      <a:headEnd type="none" w="med" len="med"/>
-                      <a:tailEnd type="none" w="med" len="med"/>
-                    </a:lnR>
-                    <a:lnT w="12700" cap="flat" cmpd="sng" algn="ctr">
-                      <a:solidFill>
-                        <a:schemeClr val="tx1"/>
-                      </a:solidFill>
-                      <a:prstDash val="solid"/>
-                      <a:round/>
-                      <a:headEnd type="none" w="med" len="med"/>
-                      <a:tailEnd type="none" w="med" len="med"/>
-                    </a:lnT>
-                    <a:lnB w="12700" cap="flat" cmpd="sng" algn="ctr">
-                      <a:solidFill>
-                        <a:schemeClr val="tx1"/>
-                      </a:solidFill>
-                      <a:prstDash val="solid"/>
-                      <a:round/>
-                      <a:headEnd type="none" w="med" len="med"/>
-                      <a:tailEnd type="none" w="med" len="med"/>
-                    </a:lnB>
-                    <a:solidFill>
-                      <a:schemeClr val="bg1"/>
-                    </a:solidFill>
-                  </a:tcPr>
-                </a:tc>
-                <a:tc>
-                  <a:txBody>
-                    <a:bodyPr/>
-                    <a:lstStyle/>
-                    <a:p>
-                      <a:pPr algn="ctr"/>
-                      <a:r>
-                        <a:rPr lang="en-US" dirty="0" smtClean="0">
-                          <a:solidFill>
-                            <a:schemeClr val="tx1"/>
-                          </a:solidFill>
-                        </a:rPr>
-                        <a:t>12</a:t>
-                      </a:r>
-                      <a:endParaRPr lang="en-US" dirty="0">
-                        <a:solidFill>
-                          <a:schemeClr val="tx1"/>
-                        </a:solidFill>
-                      </a:endParaRPr>
-                    </a:p>
-                  </a:txBody>
-                  <a:tcPr>
-                    <a:lnL w="12700" cap="flat" cmpd="sng" algn="ctr">
-                      <a:solidFill>
-                        <a:schemeClr val="tx1"/>
-                      </a:solidFill>
-                      <a:prstDash val="solid"/>
-                      <a:round/>
-                      <a:headEnd type="none" w="med" len="med"/>
-                      <a:tailEnd type="none" w="med" len="med"/>
-                    </a:lnL>
-                    <a:lnR w="12700" cap="flat" cmpd="sng" algn="ctr">
-                      <a:solidFill>
-                        <a:schemeClr val="tx1"/>
-                      </a:solidFill>
-                      <a:prstDash val="solid"/>
-                      <a:round/>
-                      <a:headEnd type="none" w="med" len="med"/>
-                      <a:tailEnd type="none" w="med" len="med"/>
-                    </a:lnR>
-                    <a:lnT w="12700" cap="flat" cmpd="sng" algn="ctr">
-                      <a:solidFill>
-                        <a:schemeClr val="tx1"/>
-                      </a:solidFill>
-                      <a:prstDash val="solid"/>
-                      <a:round/>
-                      <a:headEnd type="none" w="med" len="med"/>
-                      <a:tailEnd type="none" w="med" len="med"/>
-                    </a:lnT>
-                    <a:lnB w="12700" cap="flat" cmpd="sng" algn="ctr">
-                      <a:solidFill>
-                        <a:schemeClr val="tx1"/>
-                      </a:solidFill>
-                      <a:prstDash val="solid"/>
-                      <a:round/>
-                      <a:headEnd type="none" w="med" len="med"/>
-                      <a:tailEnd type="none" w="med" len="med"/>
-                    </a:lnB>
-                    <a:solidFill>
-                      <a:schemeClr val="bg1"/>
-                    </a:solidFill>
-                  </a:tcPr>
-                </a:tc>
-                <a:tc>
-                  <a:txBody>
-                    <a:bodyPr/>
-                    <a:lstStyle/>
-                    <a:p>
-                      <a:pPr algn="ctr"/>
-                      <a:r>
-                        <a:rPr lang="en-US" dirty="0" smtClean="0">
-                          <a:solidFill>
-                            <a:schemeClr val="tx1"/>
-                          </a:solidFill>
-                        </a:rPr>
-                        <a:t>13</a:t>
-                      </a:r>
-                      <a:endParaRPr lang="en-US" dirty="0">
-                        <a:solidFill>
-                          <a:schemeClr val="tx1"/>
-                        </a:solidFill>
-                      </a:endParaRPr>
-                    </a:p>
-                  </a:txBody>
-                  <a:tcPr>
-                    <a:lnL w="12700" cap="flat" cmpd="sng" algn="ctr">
-                      <a:solidFill>
-                        <a:schemeClr val="tx1"/>
-                      </a:solidFill>
-                      <a:prstDash val="solid"/>
-                      <a:round/>
-                      <a:headEnd type="none" w="med" len="med"/>
-                      <a:tailEnd type="none" w="med" len="med"/>
-                    </a:lnL>
-                    <a:lnR w="12700" cap="flat" cmpd="sng" algn="ctr">
-                      <a:solidFill>
-                        <a:schemeClr val="tx1"/>
-                      </a:solidFill>
-                      <a:prstDash val="solid"/>
-                      <a:round/>
-                      <a:headEnd type="none" w="med" len="med"/>
-                      <a:tailEnd type="none" w="med" len="med"/>
-                    </a:lnR>
-                    <a:lnT w="12700" cap="flat" cmpd="sng" algn="ctr">
-                      <a:solidFill>
-                        <a:schemeClr val="tx1"/>
-                      </a:solidFill>
-                      <a:prstDash val="solid"/>
-                      <a:round/>
-                      <a:headEnd type="none" w="med" len="med"/>
-                      <a:tailEnd type="none" w="med" len="med"/>
-                    </a:lnT>
-                    <a:lnB w="12700" cap="flat" cmpd="sng" algn="ctr">
-                      <a:solidFill>
-                        <a:schemeClr val="tx1"/>
-                      </a:solidFill>
-                      <a:prstDash val="solid"/>
-                      <a:round/>
-                      <a:headEnd type="none" w="med" len="med"/>
-                      <a:tailEnd type="none" w="med" len="med"/>
-                    </a:lnB>
-                    <a:solidFill>
-                      <a:schemeClr val="bg1"/>
-                    </a:solidFill>
-                  </a:tcPr>
-                </a:tc>
-                <a:tc>
-                  <a:txBody>
-                    <a:bodyPr/>
-                    <a:lstStyle/>
-                    <a:p>
-                      <a:pPr algn="ctr"/>
-                      <a:r>
-                        <a:rPr lang="en-US" dirty="0" smtClean="0">
-                          <a:solidFill>
-                            <a:srgbClr val="FF0000"/>
-                          </a:solidFill>
-                        </a:rPr>
-                        <a:t>14</a:t>
-                      </a:r>
-                      <a:endParaRPr lang="en-US" dirty="0">
-                        <a:solidFill>
-                          <a:srgbClr val="FF0000"/>
-                        </a:solidFill>
-                      </a:endParaRPr>
-                    </a:p>
-                  </a:txBody>
-                  <a:tcPr>
-                    <a:lnL w="12700" cap="flat" cmpd="sng" algn="ctr">
-                      <a:solidFill>
-                        <a:schemeClr val="tx1"/>
-                      </a:solidFill>
-                      <a:prstDash val="solid"/>
-                      <a:round/>
-                      <a:headEnd type="none" w="med" len="med"/>
-                      <a:tailEnd type="none" w="med" len="med"/>
-                    </a:lnL>
-                    <a:lnR w="12700" cap="flat" cmpd="sng" algn="ctr">
-                      <a:solidFill>
-                        <a:schemeClr val="tx1"/>
-                      </a:solidFill>
-                      <a:prstDash val="solid"/>
-                      <a:round/>
-                      <a:headEnd type="none" w="med" len="med"/>
-                      <a:tailEnd type="none" w="med" len="med"/>
-                    </a:lnR>
-                    <a:lnT w="12700" cap="flat" cmpd="sng" algn="ctr">
-                      <a:solidFill>
-                        <a:schemeClr val="tx1"/>
-                      </a:solidFill>
-                      <a:prstDash val="solid"/>
-                      <a:round/>
-                      <a:headEnd type="none" w="med" len="med"/>
-                      <a:tailEnd type="none" w="med" len="med"/>
-                    </a:lnT>
-                    <a:lnB w="12700" cap="flat" cmpd="sng" algn="ctr">
-                      <a:solidFill>
-                        <a:schemeClr val="tx1"/>
-                      </a:solidFill>
-                      <a:prstDash val="solid"/>
-                      <a:round/>
-                      <a:headEnd type="none" w="med" len="med"/>
-                      <a:tailEnd type="none" w="med" len="med"/>
-                    </a:lnB>
-                    <a:solidFill>
-                      <a:schemeClr val="bg1">
-                        <a:lumMod val="50000"/>
-                      </a:schemeClr>
-                    </a:solidFill>
-                  </a:tcPr>
-                </a:tc>
-                <a:tc>
-                  <a:txBody>
-                    <a:bodyPr/>
-                    <a:lstStyle/>
-                    <a:p>
-                      <a:pPr algn="ctr"/>
-                      <a:r>
-                        <a:rPr lang="en-US" dirty="0" smtClean="0">
-                          <a:solidFill>
-                            <a:srgbClr val="FF0000"/>
-                          </a:solidFill>
-                        </a:rPr>
-                        <a:t>15</a:t>
-                      </a:r>
-                      <a:endParaRPr lang="en-US" dirty="0">
-                        <a:solidFill>
-                          <a:srgbClr val="FF0000"/>
-                        </a:solidFill>
-                      </a:endParaRPr>
-                    </a:p>
-                  </a:txBody>
-                  <a:tcPr>
-                    <a:lnL w="12700" cap="flat" cmpd="sng" algn="ctr">
-                      <a:solidFill>
-                        <a:schemeClr val="tx1"/>
-                      </a:solidFill>
-                      <a:prstDash val="solid"/>
-                      <a:round/>
-                      <a:headEnd type="none" w="med" len="med"/>
-                      <a:tailEnd type="none" w="med" len="med"/>
-                    </a:lnL>
-                    <a:lnR w="12700" cap="flat" cmpd="sng" algn="ctr">
-                      <a:solidFill>
-                        <a:schemeClr val="tx1"/>
-                      </a:solidFill>
-                      <a:prstDash val="solid"/>
-                      <a:round/>
-                      <a:headEnd type="none" w="med" len="med"/>
-                      <a:tailEnd type="none" w="med" len="med"/>
-                    </a:lnR>
-                    <a:lnT w="12700" cap="flat" cmpd="sng" algn="ctr">
-                      <a:solidFill>
-                        <a:schemeClr val="tx1"/>
-                      </a:solidFill>
-                      <a:prstDash val="solid"/>
-                      <a:round/>
-                      <a:headEnd type="none" w="med" len="med"/>
-                      <a:tailEnd type="none" w="med" len="med"/>
-                    </a:lnT>
-                    <a:lnB w="12700" cap="flat" cmpd="sng" algn="ctr">
-                      <a:solidFill>
-                        <a:schemeClr val="tx1"/>
-                      </a:solidFill>
-                      <a:prstDash val="solid"/>
-                      <a:round/>
-                      <a:headEnd type="none" w="med" len="med"/>
-                      <a:tailEnd type="none" w="med" len="med"/>
-                    </a:lnB>
-                    <a:solidFill>
-                      <a:schemeClr val="bg1">
-                        <a:lumMod val="50000"/>
-                      </a:schemeClr>
-                    </a:solidFill>
-                  </a:tcPr>
-                </a:tc>
-                <a:tc>
-                  <a:txBody>
-                    <a:bodyPr/>
-                    <a:lstStyle/>
-                    <a:p>
-                      <a:pPr algn="ctr"/>
-                      <a:r>
-                        <a:rPr lang="en-US" dirty="0" smtClean="0">
-                          <a:solidFill>
-                            <a:srgbClr val="FF0000"/>
-                          </a:solidFill>
-                        </a:rPr>
-                        <a:t>16</a:t>
-                      </a:r>
-                      <a:endParaRPr lang="en-US" dirty="0">
-                        <a:solidFill>
-                          <a:srgbClr val="FF0000"/>
-                        </a:solidFill>
-                      </a:endParaRPr>
-                    </a:p>
-                  </a:txBody>
-                  <a:tcPr>
-                    <a:lnL w="12700" cap="flat" cmpd="sng" algn="ctr">
-                      <a:solidFill>
-                        <a:schemeClr val="tx1"/>
-                      </a:solidFill>
-                      <a:prstDash val="solid"/>
-                      <a:round/>
-                      <a:headEnd type="none" w="med" len="med"/>
-                      <a:tailEnd type="none" w="med" len="med"/>
-                    </a:lnL>
-                    <a:lnR w="12700" cap="flat" cmpd="sng" algn="ctr">
-                      <a:solidFill>
-                        <a:schemeClr val="tx1"/>
-                      </a:solidFill>
-                      <a:prstDash val="solid"/>
-                      <a:round/>
-                      <a:headEnd type="none" w="med" len="med"/>
-                      <a:tailEnd type="none" w="med" len="med"/>
-                    </a:lnR>
-                    <a:lnT w="12700" cap="flat" cmpd="sng" algn="ctr">
-                      <a:solidFill>
-                        <a:schemeClr val="tx1"/>
-                      </a:solidFill>
-                      <a:prstDash val="solid"/>
-                      <a:round/>
-                      <a:headEnd type="none" w="med" len="med"/>
-                      <a:tailEnd type="none" w="med" len="med"/>
-                    </a:lnT>
-                    <a:lnB w="12700" cap="flat" cmpd="sng" algn="ctr">
-                      <a:solidFill>
-                        <a:schemeClr val="tx1"/>
-                      </a:solidFill>
-                      <a:prstDash val="solid"/>
-                      <a:round/>
-                      <a:headEnd type="none" w="med" len="med"/>
-                      <a:tailEnd type="none" w="med" len="med"/>
-                    </a:lnB>
-                    <a:solidFill>
-                      <a:schemeClr val="bg1">
-                        <a:lumMod val="50000"/>
-                      </a:schemeClr>
-                    </a:solidFill>
-                  </a:tcPr>
-                </a:tc>
-                <a:tc>
-                  <a:txBody>
-                    <a:bodyPr/>
-                    <a:lstStyle/>
-                    <a:p>
-                      <a:pPr algn="ctr"/>
-                      <a:r>
-                        <a:rPr lang="en-US" dirty="0" smtClean="0">
-                          <a:solidFill>
-                            <a:srgbClr val="FF0000"/>
-                          </a:solidFill>
-                        </a:rPr>
-                        <a:t>17</a:t>
-                      </a:r>
-                      <a:endParaRPr lang="en-US" dirty="0">
-                        <a:solidFill>
-                          <a:srgbClr val="FF0000"/>
-                        </a:solidFill>
-                      </a:endParaRPr>
-                    </a:p>
-                  </a:txBody>
-                  <a:tcPr>
-                    <a:lnL w="12700" cap="flat" cmpd="sng" algn="ctr">
-                      <a:solidFill>
-                        <a:schemeClr val="tx1"/>
-                      </a:solidFill>
-                      <a:prstDash val="solid"/>
-                      <a:round/>
-                      <a:headEnd type="none" w="med" len="med"/>
-                      <a:tailEnd type="none" w="med" len="med"/>
-                    </a:lnL>
-                    <a:lnR w="12700" cap="flat" cmpd="sng" algn="ctr">
-                      <a:solidFill>
-                        <a:schemeClr val="tx1"/>
-                      </a:solidFill>
-                      <a:prstDash val="solid"/>
-                      <a:round/>
-                      <a:headEnd type="none" w="med" len="med"/>
-                      <a:tailEnd type="none" w="med" len="med"/>
-                    </a:lnR>
-                    <a:lnT w="12700" cap="flat" cmpd="sng" algn="ctr">
-                      <a:solidFill>
-                        <a:schemeClr val="tx1"/>
-                      </a:solidFill>
-                      <a:prstDash val="solid"/>
-                      <a:round/>
-                      <a:headEnd type="none" w="med" len="med"/>
-                      <a:tailEnd type="none" w="med" len="med"/>
-                    </a:lnT>
-                    <a:lnB w="12700" cap="flat" cmpd="sng" algn="ctr">
-                      <a:solidFill>
-                        <a:schemeClr val="tx1"/>
-                      </a:solidFill>
-                      <a:prstDash val="solid"/>
-                      <a:round/>
-                      <a:headEnd type="none" w="med" len="med"/>
-                      <a:tailEnd type="none" w="med" len="med"/>
-                    </a:lnB>
-                    <a:solidFill>
-                      <a:schemeClr val="bg1">
-                        <a:lumMod val="50000"/>
-                      </a:schemeClr>
-                    </a:solidFill>
-                  </a:tcPr>
-                </a:tc>
-                <a:tc>
-                  <a:txBody>
-                    <a:bodyPr/>
-                    <a:lstStyle/>
-                    <a:p>
-                      <a:pPr algn="ctr"/>
-                      <a:r>
-                        <a:rPr lang="en-US" dirty="0" smtClean="0">
-                          <a:solidFill>
-                            <a:srgbClr val="FF0000"/>
-                          </a:solidFill>
-                        </a:rPr>
-                        <a:t>18</a:t>
-                      </a:r>
-                      <a:endParaRPr lang="en-US" dirty="0">
-                        <a:solidFill>
-                          <a:srgbClr val="FF0000"/>
-                        </a:solidFill>
-                      </a:endParaRPr>
-                    </a:p>
-                  </a:txBody>
-                  <a:tcPr>
-                    <a:lnL w="12700" cap="flat" cmpd="sng" algn="ctr">
-                      <a:solidFill>
-                        <a:schemeClr val="tx1"/>
-                      </a:solidFill>
-                      <a:prstDash val="solid"/>
-                      <a:round/>
-                      <a:headEnd type="none" w="med" len="med"/>
-                      <a:tailEnd type="none" w="med" len="med"/>
-                    </a:lnL>
-                    <a:lnR w="12700" cap="flat" cmpd="sng" algn="ctr">
-                      <a:solidFill>
-                        <a:schemeClr val="tx1"/>
-                      </a:solidFill>
-                      <a:prstDash val="solid"/>
-                      <a:round/>
-                      <a:headEnd type="none" w="med" len="med"/>
-                      <a:tailEnd type="none" w="med" len="med"/>
-                    </a:lnR>
-                    <a:lnT w="12700" cap="flat" cmpd="sng" algn="ctr">
-                      <a:solidFill>
-                        <a:schemeClr val="tx1"/>
-                      </a:solidFill>
-                      <a:prstDash val="solid"/>
-                      <a:round/>
-                      <a:headEnd type="none" w="med" len="med"/>
-                      <a:tailEnd type="none" w="med" len="med"/>
-                    </a:lnT>
-                    <a:lnB w="12700" cap="flat" cmpd="sng" algn="ctr">
-                      <a:solidFill>
-                        <a:schemeClr val="tx1"/>
-                      </a:solidFill>
-                      <a:prstDash val="solid"/>
-                      <a:round/>
-                      <a:headEnd type="none" w="med" len="med"/>
-                      <a:tailEnd type="none" w="med" len="med"/>
-                    </a:lnB>
-                    <a:solidFill>
-                      <a:schemeClr val="bg1">
-                        <a:lumMod val="50000"/>
-                      </a:schemeClr>
-                    </a:solidFill>
-                  </a:tcPr>
-                </a:tc>
-                <a:tc>
-                  <a:txBody>
-                    <a:bodyPr/>
-                    <a:lstStyle/>
-                    <a:p>
-                      <a:pPr algn="ctr"/>
-                      <a:r>
-                        <a:rPr lang="en-US" dirty="0" smtClean="0">
-                          <a:solidFill>
-                            <a:srgbClr val="FF0000"/>
-                          </a:solidFill>
-                        </a:rPr>
-                        <a:t>19</a:t>
-                      </a:r>
-                      <a:endParaRPr lang="en-US" dirty="0">
-                        <a:solidFill>
-                          <a:srgbClr val="FF0000"/>
-                        </a:solidFill>
-                      </a:endParaRPr>
-                    </a:p>
-                  </a:txBody>
-                  <a:tcPr>
-                    <a:lnL w="12700" cap="flat" cmpd="sng" algn="ctr">
-                      <a:solidFill>
-                        <a:schemeClr val="tx1"/>
-                      </a:solidFill>
-                      <a:prstDash val="solid"/>
-                      <a:round/>
-                      <a:headEnd type="none" w="med" len="med"/>
-                      <a:tailEnd type="none" w="med" len="med"/>
-                    </a:lnL>
-                    <a:lnR w="12700" cap="flat" cmpd="sng" algn="ctr">
-                      <a:solidFill>
-                        <a:schemeClr val="tx1"/>
-                      </a:solidFill>
-                      <a:prstDash val="solid"/>
-                      <a:round/>
-                      <a:headEnd type="none" w="med" len="med"/>
-                      <a:tailEnd type="none" w="med" len="med"/>
-                    </a:lnR>
-                    <a:lnT w="12700" cap="flat" cmpd="sng" algn="ctr">
-                      <a:solidFill>
-                        <a:schemeClr val="tx1"/>
-                      </a:solidFill>
-                      <a:prstDash val="solid"/>
-                      <a:round/>
-                      <a:headEnd type="none" w="med" len="med"/>
-                      <a:tailEnd type="none" w="med" len="med"/>
-                    </a:lnT>
-                    <a:lnB w="12700" cap="flat" cmpd="sng" algn="ctr">
-                      <a:solidFill>
-                        <a:schemeClr val="tx1"/>
-                      </a:solidFill>
-                      <a:prstDash val="solid"/>
-                      <a:round/>
-                      <a:headEnd type="none" w="med" len="med"/>
-                      <a:tailEnd type="none" w="med" len="med"/>
-                    </a:lnB>
-                    <a:solidFill>
-                      <a:schemeClr val="bg1">
-                        <a:lumMod val="50000"/>
-                      </a:schemeClr>
-                    </a:solidFill>
-                  </a:tcPr>
-                </a:tc>
-                <a:tc>
-                  <a:txBody>
-                    <a:bodyPr/>
-                    <a:lstStyle/>
-                    <a:p>
-                      <a:pPr algn="ctr"/>
-                      <a:r>
-                        <a:rPr lang="en-US" dirty="0" smtClean="0">
-                          <a:solidFill>
-                            <a:srgbClr val="FF0000"/>
-                          </a:solidFill>
-                        </a:rPr>
-                        <a:t>20</a:t>
-                      </a:r>
-                      <a:endParaRPr lang="en-US" dirty="0">
-                        <a:solidFill>
-                          <a:srgbClr val="FF0000"/>
-                        </a:solidFill>
-                      </a:endParaRPr>
-                    </a:p>
-                  </a:txBody>
-                  <a:tcPr>
-                    <a:lnL w="12700" cap="flat" cmpd="sng" algn="ctr">
-                      <a:solidFill>
-                        <a:schemeClr val="tx1"/>
-                      </a:solidFill>
-                      <a:prstDash val="solid"/>
-                      <a:round/>
-                      <a:headEnd type="none" w="med" len="med"/>
-                      <a:tailEnd type="none" w="med" len="med"/>
-                    </a:lnL>
-                    <a:lnR w="12700" cap="flat" cmpd="sng" algn="ctr">
-                      <a:solidFill>
-                        <a:schemeClr val="tx1"/>
-                      </a:solidFill>
-                      <a:prstDash val="solid"/>
-                      <a:round/>
-                      <a:headEnd type="none" w="med" len="med"/>
-                      <a:tailEnd type="none" w="med" len="med"/>
-                    </a:lnR>
-                    <a:lnT w="12700" cap="flat" cmpd="sng" algn="ctr">
-                      <a:solidFill>
-                        <a:schemeClr val="tx1"/>
-                      </a:solidFill>
-                      <a:prstDash val="solid"/>
-                      <a:round/>
-                      <a:headEnd type="none" w="med" len="med"/>
-                      <a:tailEnd type="none" w="med" len="med"/>
-                    </a:lnT>
-                    <a:lnB w="12700" cap="flat" cmpd="sng" algn="ctr">
-                      <a:solidFill>
-                        <a:schemeClr val="tx1"/>
-                      </a:solidFill>
-                      <a:prstDash val="solid"/>
-                      <a:round/>
-                      <a:headEnd type="none" w="med" len="med"/>
-                      <a:tailEnd type="none" w="med" len="med"/>
-                    </a:lnB>
-                    <a:solidFill>
-                      <a:schemeClr val="bg1">
-                        <a:lumMod val="50000"/>
-                      </a:schemeClr>
-                    </a:solidFill>
-                  </a:tcPr>
-                </a:tc>
-                <a:tc>
-                  <a:txBody>
-                    <a:bodyPr/>
-                    <a:lstStyle/>
-                    <a:p>
-                      <a:pPr algn="ctr"/>
-                      <a:r>
-                        <a:rPr lang="en-US" dirty="0" smtClean="0">
-                          <a:solidFill>
-                            <a:srgbClr val="FF0000"/>
-                          </a:solidFill>
-                        </a:rPr>
-                        <a:t>21</a:t>
-                      </a:r>
-                      <a:endParaRPr lang="en-US" dirty="0">
-                        <a:solidFill>
-                          <a:srgbClr val="FF0000"/>
-                        </a:solidFill>
-                      </a:endParaRPr>
-                    </a:p>
-                  </a:txBody>
-                  <a:tcPr>
-                    <a:lnL w="12700" cap="flat" cmpd="sng" algn="ctr">
-                      <a:solidFill>
-                        <a:schemeClr val="tx1"/>
-                      </a:solidFill>
-                      <a:prstDash val="solid"/>
-                      <a:round/>
-                      <a:headEnd type="none" w="med" len="med"/>
-                      <a:tailEnd type="none" w="med" len="med"/>
-                    </a:lnL>
-                    <a:lnR w="12700" cap="flat" cmpd="sng" algn="ctr">
-                      <a:solidFill>
-                        <a:schemeClr val="tx1"/>
-                      </a:solidFill>
-                      <a:prstDash val="solid"/>
-                      <a:round/>
-                      <a:headEnd type="none" w="med" len="med"/>
-                      <a:tailEnd type="none" w="med" len="med"/>
-                    </a:lnR>
-                    <a:lnT w="12700" cap="flat" cmpd="sng" algn="ctr">
-                      <a:solidFill>
-                        <a:schemeClr val="tx1"/>
-                      </a:solidFill>
-                      <a:prstDash val="solid"/>
-                      <a:round/>
-                      <a:headEnd type="none" w="med" len="med"/>
-                      <a:tailEnd type="none" w="med" len="med"/>
-                    </a:lnT>
-                    <a:lnB w="12700" cap="flat" cmpd="sng" algn="ctr">
-                      <a:solidFill>
-                        <a:schemeClr val="tx1"/>
-                      </a:solidFill>
-                      <a:prstDash val="solid"/>
-                      <a:round/>
-                      <a:headEnd type="none" w="med" len="med"/>
-                      <a:tailEnd type="none" w="med" len="med"/>
-                    </a:lnB>
-                    <a:solidFill>
-                      <a:schemeClr val="bg1">
-                        <a:lumMod val="50000"/>
-                      </a:schemeClr>
-                    </a:solidFill>
-                  </a:tcPr>
-                </a:tc>
-                <a:tc>
-                  <a:txBody>
-                    <a:bodyPr/>
-                    <a:lstStyle/>
-                    <a:p>
-                      <a:pPr algn="ctr"/>
-                      <a:r>
-                        <a:rPr lang="en-US" dirty="0" smtClean="0">
-                          <a:solidFill>
-                            <a:srgbClr val="FF0000"/>
-                          </a:solidFill>
-                        </a:rPr>
-                        <a:t>22</a:t>
-                      </a:r>
-                      <a:endParaRPr lang="en-US" dirty="0">
-                        <a:solidFill>
-                          <a:srgbClr val="FF0000"/>
-                        </a:solidFill>
-                      </a:endParaRPr>
-                    </a:p>
-                  </a:txBody>
-                  <a:tcPr>
-                    <a:lnL w="12700" cap="flat" cmpd="sng" algn="ctr">
-                      <a:solidFill>
-                        <a:schemeClr val="tx1"/>
-                      </a:solidFill>
-                      <a:prstDash val="solid"/>
-                      <a:round/>
-                      <a:headEnd type="none" w="med" len="med"/>
-                      <a:tailEnd type="none" w="med" len="med"/>
-                    </a:lnL>
-                    <a:lnR w="12700" cap="flat" cmpd="sng" algn="ctr">
-                      <a:noFill/>
-                      <a:prstDash val="solid"/>
-                      <a:round/>
-                      <a:headEnd type="none" w="med" len="med"/>
-                      <a:tailEnd type="none" w="med" len="med"/>
-                    </a:lnR>
-                    <a:lnT w="12700" cap="flat" cmpd="sng" algn="ctr">
-                      <a:solidFill>
-                        <a:schemeClr val="tx1"/>
-                      </a:solidFill>
-                      <a:prstDash val="solid"/>
-                      <a:round/>
-                      <a:headEnd type="none" w="med" len="med"/>
-                      <a:tailEnd type="none" w="med" len="med"/>
-                    </a:lnT>
-                    <a:lnB w="12700" cap="flat" cmpd="sng" algn="ctr">
-                      <a:solidFill>
-                        <a:schemeClr val="tx1"/>
-                      </a:solidFill>
-                      <a:prstDash val="solid"/>
-                      <a:round/>
-                      <a:headEnd type="none" w="med" len="med"/>
-                      <a:tailEnd type="none" w="med" len="med"/>
-                    </a:lnB>
-                    <a:solidFill>
-                      <a:schemeClr val="bg1">
-                        <a:lumMod val="50000"/>
-                      </a:schemeClr>
-                    </a:solidFill>
-                  </a:tcPr>
-                </a:tc>
-              </a:tr>
-            </a:tbl>
-          </a:graphicData>
-        </a:graphic>
-      </p:graphicFrame>
-      <p:sp>
-        <p:nvSpPr>
-          <p:cNvPr id="8" name="Title 1"/>
-          <p:cNvSpPr>
-            <a:spLocks noGrp="1"/>
-          </p:cNvSpPr>
-          <p:nvPr>
-            <p:ph type="title"/>
-          </p:nvPr>
-        </p:nvSpPr>
-        <p:spPr>
-          <a:xfrm>
-            <a:off x="65088" y="122238"/>
-            <a:ext cx="9012237" cy="868362"/>
-          </a:xfrm>
-        </p:spPr>
-        <p:txBody>
-          <a:bodyPr/>
-          <a:lstStyle/>
-          <a:p>
-            <a:r>
-              <a:rPr lang="en-US" dirty="0"/>
-              <a:t>Length Limits –</a:t>
-            </a:r>
-            <a:r>
-              <a:rPr lang="en-US" dirty="0" smtClean="0"/>
-              <a:t> Maximum</a:t>
-            </a:r>
-            <a:endParaRPr lang="en-US" dirty="0"/>
-          </a:p>
-        </p:txBody>
-      </p:sp>
-    </p:spTree>
-    <p:extLst>
-      <p:ext uri="{BB962C8B-B14F-4D97-AF65-F5344CB8AC3E}">
-        <p14:creationId xmlns:p14="http://schemas.microsoft.com/office/powerpoint/2010/main" val="1360340537"/>
-      </p:ext>
-    </p:extLst>
-  </p:cSld>
-  <p:clrMapOvr>
-    <a:masterClrMapping/>
-  </p:clrMapOvr>
-  <mc:AlternateContent xmlns:mc="http://schemas.openxmlformats.org/markup-compatibility/2006" xmlns:p14="http://schemas.microsoft.com/office/powerpoint/2010/main">
-    <mc:Choice Requires="p14">
-      <p:transition spd="slow" p14:dur="2000"/>
-    </mc:Choice>
-    <mc:Fallback xmlns="">
-      <p:transition spd="slow"/>
-    </mc:Fallback>
-  </mc:AlternateContent>
-  <p:timing>
-    <p:tnLst>
-      <p:par>
-        <p:cTn id="1" dur="indefinite" restart="never" nodeType="tmRoot">
-          <p:childTnLst>
-            <p:seq concurrent="1" nextAc="seek">
-              <p:cTn id="2" dur="indefinite" nodeType="mainSeq">
-                <p:childTnLst>
                   <p:par>
-                    <p:cTn id="3" fill="hold">
+                    <p:cTn id="17" fill="hold">
                       <p:stCondLst>
                         <p:cond delay="indefinite"/>
                       </p:stCondLst>
                       <p:childTnLst>
                         <p:par>
-                          <p:cTn id="4" fill="hold">
+                          <p:cTn id="18" fill="hold">
                             <p:stCondLst>
                               <p:cond delay="0"/>
                             </p:stCondLst>
                             <p:childTnLst>
                               <p:par>
-                                <p:cTn id="5" presetID="1" presetClass="entr" presetSubtype="0" fill="hold" grpId="0" nodeType="clickEffect">
+                                <p:cTn id="19" presetID="1" presetClass="entr" presetSubtype="0" fill="hold" grpId="0" nodeType="clickEffect">
                                   <p:stCondLst>
                                     <p:cond delay="0"/>
                                   </p:stCondLst>
                                   <p:childTnLst>
                                     <p:set>
                                       <p:cBhvr>
-                                        <p:cTn id="6" dur="1" fill="hold">
+                                        <p:cTn id="20" dur="1" fill="hold">
                                           <p:stCondLst>
                                             <p:cond delay="0"/>
                                           </p:stCondLst>
@@ -18834,105 +20698,7 @@
                                         <p:tgtEl>
                                           <p:spTgt spid="3">
                                             <p:txEl>
-                                              <p:pRg st="1" end="1"/>
-                                            </p:txEl>
-                                          </p:spTgt>
-                                        </p:tgtEl>
-                                        <p:attrNameLst>
-                                          <p:attrName>style.visibility</p:attrName>
-                                        </p:attrNameLst>
-                                      </p:cBhvr>
-                                      <p:to>
-                                        <p:strVal val="visible"/>
-                                      </p:to>
-                                    </p:set>
-                                  </p:childTnLst>
-                                </p:cTn>
-                              </p:par>
-                            </p:childTnLst>
-                          </p:cTn>
-                        </p:par>
-                      </p:childTnLst>
-                    </p:cTn>
-                  </p:par>
-                  <p:par>
-                    <p:cTn id="7" fill="hold">
-                      <p:stCondLst>
-                        <p:cond delay="indefinite"/>
-                      </p:stCondLst>
-                      <p:childTnLst>
-                        <p:par>
-                          <p:cTn id="8" fill="hold">
-                            <p:stCondLst>
-                              <p:cond delay="0"/>
-                            </p:stCondLst>
-                            <p:childTnLst>
-                              <p:par>
-                                <p:cTn id="9" presetID="1" presetClass="entr" presetSubtype="0" fill="hold" grpId="0" nodeType="clickEffect">
-                                  <p:stCondLst>
-                                    <p:cond delay="0"/>
-                                  </p:stCondLst>
-                                  <p:childTnLst>
-                                    <p:set>
-                                      <p:cBhvr>
-                                        <p:cTn id="10" dur="1" fill="hold">
-                                          <p:stCondLst>
-                                            <p:cond delay="0"/>
-                                          </p:stCondLst>
-                                        </p:cTn>
-                                        <p:tgtEl>
-                                          <p:spTgt spid="3">
-                                            <p:txEl>
-                                              <p:pRg st="2" end="2"/>
-                                            </p:txEl>
-                                          </p:spTgt>
-                                        </p:tgtEl>
-                                        <p:attrNameLst>
-                                          <p:attrName>style.visibility</p:attrName>
-                                        </p:attrNameLst>
-                                      </p:cBhvr>
-                                      <p:to>
-                                        <p:strVal val="visible"/>
-                                      </p:to>
-                                    </p:set>
-                                  </p:childTnLst>
-                                </p:cTn>
-                              </p:par>
-                            </p:childTnLst>
-                          </p:cTn>
-                        </p:par>
-                      </p:childTnLst>
-                    </p:cTn>
-                  </p:par>
-                  <p:par>
-                    <p:cTn id="11" fill="hold">
-                      <p:stCondLst>
-                        <p:cond delay="indefinite"/>
-                      </p:stCondLst>
-                      <p:childTnLst>
-                        <p:par>
-                          <p:cTn id="12" fill="hold">
-                            <p:stCondLst>
-                              <p:cond delay="0"/>
-                            </p:stCondLst>
-                            <p:childTnLst>
-                              <p:par>
-                                <p:cTn id="13" presetID="1" presetClass="entr" presetSubtype="0" fill="hold" grpId="0" nodeType="clickEffect">
-                                  <p:stCondLst>
-                                    <p:cond delay="0"/>
-                                  </p:stCondLst>
-                                  <p:childTnLst>
-                                    <p:set>
-                                      <p:cBhvr>
-                                        <p:cTn id="14" dur="1" fill="hold">
-                                          <p:stCondLst>
-                                            <p:cond delay="0"/>
-                                          </p:stCondLst>
-                                        </p:cTn>
-                                        <p:tgtEl>
-                                          <p:spTgt spid="3">
-                                            <p:txEl>
-                                              <p:pRg st="3" end="3"/>
+                                              <p:pRg st="7" end="7"/>
                                             </p:txEl>
                                           </p:spTgt>
                                         </p:tgtEl>
@@ -18975,7 +20741,7 @@
       </p:par>
     </p:tnLst>
     <p:bldLst>
-      <p:bldP spid="3" grpId="0" build="p"/>
+      <p:bldP spid="3" grpId="0" uiExpand="1" build="p"/>
     </p:bldLst>
   </p:timing>
 </p:sld>

</xml_diff>